<commit_message>
f22 thru week 3 updates
</commit_message>
<xml_diff>
--- a/Week03/Review.pptx
+++ b/Week03/Review.pptx
@@ -223,7 +223,7 @@
           <a:p>
             <a:fld id="{19104133-B5B0-4351-8158-4F0E5EB1E2BF}" type="datetimeFigureOut">
               <a:rPr lang="en-US" smtClean="0"/>
-              <a:t>3/24/2020</a:t>
+              <a:t>9/6/2022</a:t>
             </a:fld>
             <a:endParaRPr lang="en-US"/>
           </a:p>
@@ -287,38 +287,37 @@
           <a:p>
             <a:pPr lvl="0"/>
             <a:r>
-              <a:rPr lang="en-US" smtClean="0"/>
+              <a:rPr lang="en-US"/>
               <a:t>Edit Master text styles</a:t>
             </a:r>
           </a:p>
           <a:p>
             <a:pPr lvl="1"/>
             <a:r>
-              <a:rPr lang="en-US" smtClean="0"/>
+              <a:rPr lang="en-US"/>
               <a:t>Second level</a:t>
             </a:r>
           </a:p>
           <a:p>
             <a:pPr lvl="2"/>
             <a:r>
-              <a:rPr lang="en-US" smtClean="0"/>
+              <a:rPr lang="en-US"/>
               <a:t>Third level</a:t>
             </a:r>
           </a:p>
           <a:p>
             <a:pPr lvl="3"/>
             <a:r>
-              <a:rPr lang="en-US" smtClean="0"/>
+              <a:rPr lang="en-US"/>
               <a:t>Fourth level</a:t>
             </a:r>
           </a:p>
           <a:p>
             <a:pPr lvl="4"/>
             <a:r>
-              <a:rPr lang="en-US" smtClean="0"/>
+              <a:rPr lang="en-US"/>
               <a:t>Fifth level</a:t>
             </a:r>
-            <a:endParaRPr lang="en-US"/>
           </a:p>
         </p:txBody>
       </p:sp>
@@ -536,10 +535,9 @@
           <a:lstStyle/>
           <a:p>
             <a:r>
-              <a:rPr lang="en-US" dirty="0" smtClean="0"/>
+              <a:rPr lang="en-US" dirty="0"/>
               <a:t>number</a:t>
             </a:r>
-            <a:endParaRPr lang="en-US" dirty="0"/>
           </a:p>
         </p:txBody>
       </p:sp>
@@ -624,10 +622,9 @@
           <a:lstStyle/>
           <a:p>
             <a:r>
-              <a:rPr lang="en-US" dirty="0" smtClean="0"/>
+              <a:rPr lang="en-US" dirty="0"/>
               <a:t>string</a:t>
             </a:r>
-            <a:endParaRPr lang="en-US" dirty="0"/>
           </a:p>
         </p:txBody>
       </p:sp>
@@ -712,10 +709,9 @@
           <a:lstStyle/>
           <a:p>
             <a:r>
-              <a:rPr lang="en-US" dirty="0" smtClean="0"/>
+              <a:rPr lang="en-US" dirty="0"/>
               <a:t>120</a:t>
             </a:r>
-            <a:endParaRPr lang="en-US" dirty="0"/>
           </a:p>
         </p:txBody>
       </p:sp>
@@ -800,10 +796,9 @@
           <a:lstStyle/>
           <a:p>
             <a:r>
-              <a:rPr lang="en-US" dirty="0" smtClean="0"/>
+              <a:rPr lang="en-US" dirty="0"/>
               <a:t>‘2018’</a:t>
             </a:r>
-            <a:endParaRPr lang="en-US" dirty="0"/>
           </a:p>
         </p:txBody>
       </p:sp>
@@ -888,10 +883,9 @@
           <a:lstStyle/>
           <a:p>
             <a:r>
-              <a:rPr lang="en-US" dirty="0" smtClean="0"/>
+              <a:rPr lang="en-US" dirty="0"/>
               <a:t>9.5</a:t>
             </a:r>
-            <a:endParaRPr lang="en-US" dirty="0"/>
           </a:p>
         </p:txBody>
       </p:sp>
@@ -976,10 +970,9 @@
           <a:lstStyle/>
           <a:p>
             <a:r>
-              <a:rPr lang="en-US" dirty="0" smtClean="0"/>
+              <a:rPr lang="en-US" dirty="0"/>
               <a:t>number</a:t>
             </a:r>
-            <a:endParaRPr lang="en-US" dirty="0"/>
           </a:p>
         </p:txBody>
       </p:sp>
@@ -1064,10 +1057,9 @@
           <a:lstStyle/>
           <a:p>
             <a:r>
-              <a:rPr lang="en-US" dirty="0" smtClean="0"/>
+              <a:rPr lang="en-US" dirty="0"/>
               <a:t>string</a:t>
             </a:r>
-            <a:endParaRPr lang="en-US" dirty="0"/>
           </a:p>
         </p:txBody>
       </p:sp>
@@ -1152,10 +1144,9 @@
           <a:lstStyle/>
           <a:p>
             <a:r>
-              <a:rPr lang="en-US" dirty="0" smtClean="0"/>
+              <a:rPr lang="en-US" dirty="0"/>
               <a:t>number</a:t>
             </a:r>
-            <a:endParaRPr lang="en-US" dirty="0"/>
           </a:p>
         </p:txBody>
       </p:sp>
@@ -1240,10 +1231,9 @@
           <a:lstStyle/>
           <a:p>
             <a:r>
-              <a:rPr lang="en-US" dirty="0" smtClean="0"/>
+              <a:rPr lang="en-US" dirty="0"/>
               <a:t>string</a:t>
             </a:r>
-            <a:endParaRPr lang="en-US" dirty="0"/>
           </a:p>
         </p:txBody>
       </p:sp>
@@ -1328,10 +1318,9 @@
           <a:lstStyle/>
           <a:p>
             <a:r>
-              <a:rPr lang="en-US" dirty="0" smtClean="0"/>
+              <a:rPr lang="en-US" dirty="0"/>
               <a:t>number</a:t>
             </a:r>
-            <a:endParaRPr lang="en-US" dirty="0"/>
           </a:p>
         </p:txBody>
       </p:sp>
@@ -1416,10 +1405,9 @@
           <a:lstStyle/>
           <a:p>
             <a:r>
-              <a:rPr lang="en-US" dirty="0" smtClean="0"/>
+              <a:rPr lang="en-US" dirty="0"/>
               <a:t>string</a:t>
             </a:r>
-            <a:endParaRPr lang="en-US" dirty="0"/>
           </a:p>
         </p:txBody>
       </p:sp>
@@ -1504,10 +1492,9 @@
           <a:lstStyle/>
           <a:p>
             <a:r>
-              <a:rPr lang="en-US" dirty="0" smtClean="0"/>
+              <a:rPr lang="en-US" dirty="0"/>
               <a:t>string</a:t>
             </a:r>
-            <a:endParaRPr lang="en-US" dirty="0"/>
           </a:p>
         </p:txBody>
       </p:sp>
@@ -1592,10 +1579,9 @@
           <a:lstStyle/>
           <a:p>
             <a:r>
-              <a:rPr lang="en-US" dirty="0" smtClean="0"/>
+              <a:rPr lang="en-US" dirty="0"/>
               <a:t>number</a:t>
             </a:r>
-            <a:endParaRPr lang="en-US" dirty="0"/>
           </a:p>
         </p:txBody>
       </p:sp>
@@ -1775,15 +1761,7 @@
           <a:p>
             <a:r>
               <a:rPr lang="en-US" dirty="0"/>
-              <a:t>Click to edit Master </a:t>
-            </a:r>
-            <a:r>
-              <a:rPr lang="en-US" dirty="0" smtClean="0"/>
-              <a:t>subtitle </a:t>
-            </a:r>
-            <a:r>
-              <a:rPr lang="en-US" dirty="0"/>
-              <a:t>style</a:t>
+              <a:t>Click to edit Master subtitle style</a:t>
             </a:r>
           </a:p>
         </p:txBody>
@@ -1825,7 +1803,7 @@
             <a:fld id="{1C2D31DE-C454-491C-B5C3-F097855E3DF7}" type="datetime4">
               <a:rPr lang="en-US" smtClean="0"/>
               <a:pPr/>
-              <a:t>March 24, 2020</a:t>
+              <a:t>September 6, 2022</a:t>
             </a:fld>
             <a:endParaRPr lang="en-US" dirty="0"/>
           </a:p>
@@ -4899,17 +4877,16 @@
           <a:p>
             <a:pPr lvl="0"/>
             <a:r>
-              <a:rPr lang="en-US" dirty="0" smtClean="0"/>
+              <a:rPr lang="en-US" dirty="0"/>
               <a:t>Presenter Name</a:t>
             </a:r>
             <a:br>
-              <a:rPr lang="en-US" dirty="0" smtClean="0"/>
+              <a:rPr lang="en-US" dirty="0"/>
             </a:br>
             <a:r>
-              <a:rPr lang="en-US" dirty="0" smtClean="0"/>
+              <a:rPr lang="en-US" dirty="0"/>
               <a:t>Presenter Title</a:t>
             </a:r>
-            <a:endParaRPr lang="en-US" dirty="0"/>
           </a:p>
         </p:txBody>
       </p:sp>
@@ -4926,13 +4903,6 @@
   <p:transition>
     <p:fade/>
   </p:transition>
-  <p:timing>
-    <p:tnLst>
-      <p:par>
-        <p:cTn id="1" dur="indefinite" restart="never" nodeType="tmRoot"/>
-      </p:par>
-    </p:tnLst>
-  </p:timing>
   <p:hf sldNum="0" hdr="0" ftr="0"/>
 </p:sldLayout>
 </file>
@@ -5225,7 +5195,7 @@
           <a:p>
             <a:fld id="{5958763E-B898-436D-883D-03711491D54A}" type="datetimeFigureOut">
               <a:rPr lang="en-US" smtClean="0"/>
-              <a:t>3/24/2020</a:t>
+              <a:t>9/6/2022</a:t>
             </a:fld>
             <a:endParaRPr lang="en-US"/>
           </a:p>
@@ -5298,13 +5268,6 @@
   <p:transition>
     <p:fade/>
   </p:transition>
-  <p:timing>
-    <p:tnLst>
-      <p:par>
-        <p:cTn id="1" dur="indefinite" restart="never" nodeType="tmRoot"/>
-      </p:par>
-    </p:tnLst>
-  </p:timing>
 </p:sldLayout>
 </file>
 
@@ -5353,10 +5316,9 @@
           </a:lstStyle>
           <a:p>
             <a:r>
-              <a:rPr lang="en-US" dirty="0" smtClean="0"/>
+              <a:rPr lang="en-US" dirty="0"/>
               <a:t>Click icon to add picture</a:t>
             </a:r>
-            <a:endParaRPr lang="en-US" dirty="0"/>
           </a:p>
         </p:txBody>
       </p:sp>
@@ -5426,7 +5388,7 @@
           <a:p>
             <a:fld id="{5958763E-B898-436D-883D-03711491D54A}" type="datetimeFigureOut">
               <a:rPr lang="en-US" smtClean="0"/>
-              <a:t>3/24/2020</a:t>
+              <a:t>9/6/2022</a:t>
             </a:fld>
             <a:endParaRPr lang="en-US"/>
           </a:p>
@@ -5499,13 +5461,6 @@
   <p:transition>
     <p:fade/>
   </p:transition>
-  <p:timing>
-    <p:tnLst>
-      <p:par>
-        <p:cTn id="1" dur="indefinite" restart="never" nodeType="tmRoot"/>
-      </p:par>
-    </p:tnLst>
-  </p:timing>
 </p:sldLayout>
 </file>
 
@@ -5683,7 +5638,7 @@
           <a:p>
             <a:fld id="{5958763E-B898-436D-883D-03711491D54A}" type="datetimeFigureOut">
               <a:rPr lang="en-US" smtClean="0"/>
-              <a:t>3/24/2020</a:t>
+              <a:t>9/6/2022</a:t>
             </a:fld>
             <a:endParaRPr lang="en-US"/>
           </a:p>
@@ -5756,13 +5711,6 @@
   <p:transition>
     <p:fade/>
   </p:transition>
-  <p:timing>
-    <p:tnLst>
-      <p:par>
-        <p:cTn id="1" dur="indefinite" restart="never" nodeType="tmRoot"/>
-      </p:par>
-    </p:tnLst>
-  </p:timing>
 </p:sldLayout>
 </file>
 
@@ -6038,7 +5986,7 @@
           <a:p>
             <a:fld id="{5958763E-B898-436D-883D-03711491D54A}" type="datetimeFigureOut">
               <a:rPr lang="en-US" smtClean="0"/>
-              <a:t>3/24/2020</a:t>
+              <a:t>9/6/2022</a:t>
             </a:fld>
             <a:endParaRPr lang="en-US"/>
           </a:p>
@@ -6099,13 +6047,6 @@
   <p:transition>
     <p:fade/>
   </p:transition>
-  <p:timing>
-    <p:tnLst>
-      <p:par>
-        <p:cTn id="1" dur="indefinite" restart="never" nodeType="tmRoot"/>
-      </p:par>
-    </p:tnLst>
-  </p:timing>
 </p:sldLayout>
 </file>
 
@@ -6461,7 +6402,7 @@
           <a:p>
             <a:fld id="{5958763E-B898-436D-883D-03711491D54A}" type="datetimeFigureOut">
               <a:rPr lang="en-US" smtClean="0"/>
-              <a:t>3/24/2020</a:t>
+              <a:t>9/6/2022</a:t>
             </a:fld>
             <a:endParaRPr lang="en-US"/>
           </a:p>
@@ -6522,13 +6463,6 @@
   <p:transition>
     <p:fade/>
   </p:transition>
-  <p:timing>
-    <p:tnLst>
-      <p:par>
-        <p:cTn id="1" dur="indefinite" restart="never" nodeType="tmRoot"/>
-      </p:par>
-    </p:tnLst>
-  </p:timing>
 </p:sldLayout>
 </file>
 
@@ -6969,7 +6903,7 @@
           <a:p>
             <a:fld id="{5958763E-B898-436D-883D-03711491D54A}" type="datetimeFigureOut">
               <a:rPr lang="en-US" smtClean="0"/>
-              <a:t>3/24/2020</a:t>
+              <a:t>9/6/2022</a:t>
             </a:fld>
             <a:endParaRPr lang="en-US"/>
           </a:p>
@@ -7030,13 +6964,6 @@
   <p:transition>
     <p:fade/>
   </p:transition>
-  <p:timing>
-    <p:tnLst>
-      <p:par>
-        <p:cTn id="1" dur="indefinite" restart="never" nodeType="tmRoot"/>
-      </p:par>
-    </p:tnLst>
-  </p:timing>
 </p:sldLayout>
 </file>
 
@@ -7427,7 +7354,7 @@
           <a:p>
             <a:fld id="{5958763E-B898-436D-883D-03711491D54A}" type="datetimeFigureOut">
               <a:rPr lang="en-US" smtClean="0"/>
-              <a:t>3/24/2020</a:t>
+              <a:t>9/6/2022</a:t>
             </a:fld>
             <a:endParaRPr lang="en-US"/>
           </a:p>
@@ -7488,13 +7415,6 @@
   <p:transition>
     <p:fade/>
   </p:transition>
-  <p:timing>
-    <p:tnLst>
-      <p:par>
-        <p:cTn id="1" dur="indefinite" restart="never" nodeType="tmRoot"/>
-      </p:par>
-    </p:tnLst>
-  </p:timing>
 </p:sldLayout>
 </file>
 
@@ -8045,7 +7965,7 @@
           <a:p>
             <a:fld id="{5958763E-B898-436D-883D-03711491D54A}" type="datetimeFigureOut">
               <a:rPr lang="en-US" smtClean="0"/>
-              <a:t>3/24/2020</a:t>
+              <a:t>9/6/2022</a:t>
             </a:fld>
             <a:endParaRPr lang="en-US"/>
           </a:p>
@@ -8106,13 +8026,6 @@
   <p:transition>
     <p:fade/>
   </p:transition>
-  <p:timing>
-    <p:tnLst>
-      <p:par>
-        <p:cTn id="1" dur="indefinite" restart="never" nodeType="tmRoot"/>
-      </p:par>
-    </p:tnLst>
-  </p:timing>
 </p:sldLayout>
 </file>
 
@@ -8823,7 +8736,7 @@
           <a:p>
             <a:fld id="{5958763E-B898-436D-883D-03711491D54A}" type="datetimeFigureOut">
               <a:rPr lang="en-US" smtClean="0"/>
-              <a:t>3/24/2020</a:t>
+              <a:t>9/6/2022</a:t>
             </a:fld>
             <a:endParaRPr lang="en-US"/>
           </a:p>
@@ -8884,13 +8797,6 @@
   <p:transition>
     <p:fade/>
   </p:transition>
-  <p:timing>
-    <p:tnLst>
-      <p:par>
-        <p:cTn id="1" dur="indefinite" restart="never" nodeType="tmRoot"/>
-      </p:par>
-    </p:tnLst>
-  </p:timing>
 </p:sldLayout>
 </file>
 
@@ -8934,7 +8840,7 @@
           <a:p>
             <a:fld id="{5958763E-B898-436D-883D-03711491D54A}" type="datetimeFigureOut">
               <a:rPr lang="en-US" smtClean="0"/>
-              <a:t>3/24/2020</a:t>
+              <a:t>9/6/2022</a:t>
             </a:fld>
             <a:endParaRPr lang="en-US"/>
           </a:p>
@@ -9007,13 +8913,6 @@
   <p:transition>
     <p:fade/>
   </p:transition>
-  <p:timing>
-    <p:tnLst>
-      <p:par>
-        <p:cTn id="1" dur="indefinite" restart="never" nodeType="tmRoot"/>
-      </p:par>
-    </p:tnLst>
-  </p:timing>
 </p:sldLayout>
 </file>
 
@@ -9093,7 +8992,7 @@
                 <a:spcPct val="0"/>
               </a:spcAft>
             </a:pPr>
-            <a:endParaRPr lang="en-US" sz="2400" dirty="0" err="1" smtClean="0">
+            <a:endParaRPr lang="en-US" sz="2400" dirty="0" err="1">
               <a:gradFill>
                 <a:gsLst>
                   <a:gs pos="0">
@@ -9226,15 +9125,7 @@
           <a:p>
             <a:r>
               <a:rPr lang="en-US" dirty="0"/>
-              <a:t>Click to edit Master </a:t>
-            </a:r>
-            <a:r>
-              <a:rPr lang="en-US" dirty="0" smtClean="0"/>
-              <a:t>subtitle </a:t>
-            </a:r>
-            <a:r>
-              <a:rPr lang="en-US" dirty="0"/>
-              <a:t>style</a:t>
+              <a:t>Click to edit Master subtitle style</a:t>
             </a:r>
           </a:p>
         </p:txBody>
@@ -9276,7 +9167,7 @@
             <a:fld id="{1C2D31DE-C454-491C-B5C3-F097855E3DF7}" type="datetime4">
               <a:rPr lang="en-US" smtClean="0"/>
               <a:pPr/>
-              <a:t>March 24, 2020</a:t>
+              <a:t>September 6, 2022</a:t>
             </a:fld>
             <a:endParaRPr lang="en-US" dirty="0"/>
           </a:p>
@@ -12350,17 +12241,16 @@
           <a:p>
             <a:pPr lvl="0"/>
             <a:r>
-              <a:rPr lang="en-US" dirty="0" smtClean="0"/>
+              <a:rPr lang="en-US" dirty="0"/>
               <a:t>Presenter Name</a:t>
             </a:r>
             <a:br>
-              <a:rPr lang="en-US" dirty="0" smtClean="0"/>
+              <a:rPr lang="en-US" dirty="0"/>
             </a:br>
             <a:r>
-              <a:rPr lang="en-US" dirty="0" smtClean="0"/>
+              <a:rPr lang="en-US" dirty="0"/>
               <a:t>Presenter Title</a:t>
             </a:r>
-            <a:endParaRPr lang="en-US" dirty="0"/>
           </a:p>
         </p:txBody>
       </p:sp>
@@ -12377,13 +12267,6 @@
   <p:transition>
     <p:fade/>
   </p:transition>
-  <p:timing>
-    <p:tnLst>
-      <p:par>
-        <p:cTn id="1" dur="indefinite" restart="never" nodeType="tmRoot"/>
-      </p:par>
-    </p:tnLst>
-  </p:timing>
   <p:hf sldNum="0" hdr="0" ftr="0"/>
 </p:sldLayout>
 </file>
@@ -12436,7 +12319,7 @@
           <a:p>
             <a:fld id="{5958763E-B898-436D-883D-03711491D54A}" type="datetimeFigureOut">
               <a:rPr lang="en-US" smtClean="0"/>
-              <a:t>3/24/2020</a:t>
+              <a:t>9/6/2022</a:t>
             </a:fld>
             <a:endParaRPr lang="en-US"/>
           </a:p>
@@ -12509,13 +12392,6 @@
   <p:transition>
     <p:fade/>
   </p:transition>
-  <p:timing>
-    <p:tnLst>
-      <p:par>
-        <p:cTn id="1" dur="indefinite" restart="never" nodeType="tmRoot"/>
-      </p:par>
-    </p:tnLst>
-  </p:timing>
 </p:sldLayout>
 </file>
 
@@ -12567,7 +12443,7 @@
           <a:p>
             <a:fld id="{5958763E-B898-436D-883D-03711491D54A}" type="datetimeFigureOut">
               <a:rPr lang="en-US" smtClean="0"/>
-              <a:t>3/24/2020</a:t>
+              <a:t>9/6/2022</a:t>
             </a:fld>
             <a:endParaRPr lang="en-US"/>
           </a:p>
@@ -12640,13 +12516,6 @@
   <p:transition>
     <p:fade/>
   </p:transition>
-  <p:timing>
-    <p:tnLst>
-      <p:par>
-        <p:cTn id="1" dur="indefinite" restart="never" nodeType="tmRoot"/>
-      </p:par>
-    </p:tnLst>
-  </p:timing>
 </p:sldLayout>
 </file>
 
@@ -12698,7 +12567,7 @@
           <a:p>
             <a:fld id="{5958763E-B898-436D-883D-03711491D54A}" type="datetimeFigureOut">
               <a:rPr lang="en-US" smtClean="0"/>
-              <a:t>3/24/2020</a:t>
+              <a:t>9/6/2022</a:t>
             </a:fld>
             <a:endParaRPr lang="en-US"/>
           </a:p>
@@ -12771,13 +12640,6 @@
   <p:transition>
     <p:fade/>
   </p:transition>
-  <p:timing>
-    <p:tnLst>
-      <p:par>
-        <p:cTn id="1" dur="indefinite" restart="never" nodeType="tmRoot"/>
-      </p:par>
-    </p:tnLst>
-  </p:timing>
 </p:sldLayout>
 </file>
 
@@ -12829,7 +12691,7 @@
           <a:p>
             <a:fld id="{5958763E-B898-436D-883D-03711491D54A}" type="datetimeFigureOut">
               <a:rPr lang="en-US" smtClean="0"/>
-              <a:t>3/24/2020</a:t>
+              <a:t>9/6/2022</a:t>
             </a:fld>
             <a:endParaRPr lang="en-US"/>
           </a:p>
@@ -12902,13 +12764,6 @@
   <p:transition>
     <p:fade/>
   </p:transition>
-  <p:timing>
-    <p:tnLst>
-      <p:par>
-        <p:cTn id="1" dur="indefinite" restart="never" nodeType="tmRoot"/>
-      </p:par>
-    </p:tnLst>
-  </p:timing>
 </p:sldLayout>
 </file>
 
@@ -12960,7 +12815,7 @@
           <a:p>
             <a:fld id="{5958763E-B898-436D-883D-03711491D54A}" type="datetimeFigureOut">
               <a:rPr lang="en-US" smtClean="0"/>
-              <a:t>3/24/2020</a:t>
+              <a:t>9/6/2022</a:t>
             </a:fld>
             <a:endParaRPr lang="en-US"/>
           </a:p>
@@ -13033,13 +12888,6 @@
   <p:transition>
     <p:fade/>
   </p:transition>
-  <p:timing>
-    <p:tnLst>
-      <p:par>
-        <p:cTn id="1" dur="indefinite" restart="never" nodeType="tmRoot"/>
-      </p:par>
-    </p:tnLst>
-  </p:timing>
 </p:sldLayout>
 </file>
 
@@ -13091,7 +12939,7 @@
           <a:p>
             <a:fld id="{5958763E-B898-436D-883D-03711491D54A}" type="datetimeFigureOut">
               <a:rPr lang="en-US" smtClean="0"/>
-              <a:t>3/24/2020</a:t>
+              <a:t>9/6/2022</a:t>
             </a:fld>
             <a:endParaRPr lang="en-US"/>
           </a:p>
@@ -13164,13 +13012,6 @@
   <p:transition>
     <p:fade/>
   </p:transition>
-  <p:timing>
-    <p:tnLst>
-      <p:par>
-        <p:cTn id="1" dur="indefinite" restart="never" nodeType="tmRoot"/>
-      </p:par>
-    </p:tnLst>
-  </p:timing>
 </p:sldLayout>
 </file>
 
@@ -13222,7 +13063,7 @@
           <a:p>
             <a:fld id="{5958763E-B898-436D-883D-03711491D54A}" type="datetimeFigureOut">
               <a:rPr lang="en-US" smtClean="0"/>
-              <a:t>3/24/2020</a:t>
+              <a:t>9/6/2022</a:t>
             </a:fld>
             <a:endParaRPr lang="en-US"/>
           </a:p>
@@ -13295,13 +13136,6 @@
   <p:transition>
     <p:fade/>
   </p:transition>
-  <p:timing>
-    <p:tnLst>
-      <p:par>
-        <p:cTn id="1" dur="indefinite" restart="never" nodeType="tmRoot"/>
-      </p:par>
-    </p:tnLst>
-  </p:timing>
 </p:sldLayout>
 </file>
 
@@ -13353,7 +13187,7 @@
           <a:p>
             <a:fld id="{5958763E-B898-436D-883D-03711491D54A}" type="datetimeFigureOut">
               <a:rPr lang="en-US" smtClean="0"/>
-              <a:t>3/24/2020</a:t>
+              <a:t>9/6/2022</a:t>
             </a:fld>
             <a:endParaRPr lang="en-US"/>
           </a:p>
@@ -13426,13 +13260,6 @@
   <p:transition>
     <p:fade/>
   </p:transition>
-  <p:timing>
-    <p:tnLst>
-      <p:par>
-        <p:cTn id="1" dur="indefinite" restart="never" nodeType="tmRoot"/>
-      </p:par>
-    </p:tnLst>
-  </p:timing>
 </p:sldLayout>
 </file>
 
@@ -13493,7 +13320,7 @@
           <a:p>
             <a:fld id="{5958763E-B898-436D-883D-03711491D54A}" type="datetimeFigureOut">
               <a:rPr lang="en-US" smtClean="0"/>
-              <a:t>3/24/2020</a:t>
+              <a:t>9/6/2022</a:t>
             </a:fld>
             <a:endParaRPr lang="en-US"/>
           </a:p>
@@ -13566,13 +13393,6 @@
   <p:transition>
     <p:fade/>
   </p:transition>
-  <p:timing>
-    <p:tnLst>
-      <p:par>
-        <p:cTn id="1" dur="indefinite" restart="never" nodeType="tmRoot"/>
-      </p:par>
-    </p:tnLst>
-  </p:timing>
 </p:sldLayout>
 </file>
 
@@ -16574,13 +16394,6 @@
   <p:transition>
     <p:fade/>
   </p:transition>
-  <p:timing>
-    <p:tnLst>
-      <p:par>
-        <p:cTn id="1" dur="indefinite" restart="never" nodeType="tmRoot"/>
-      </p:par>
-    </p:tnLst>
-  </p:timing>
 </p:sldLayout>
 </file>
 
@@ -16668,7 +16481,7 @@
                 <a:spcPct val="0"/>
               </a:spcAft>
             </a:pPr>
-            <a:endParaRPr lang="en-US" sz="2400" dirty="0" err="1" smtClean="0">
+            <a:endParaRPr lang="en-US" sz="2400" dirty="0" err="1">
               <a:gradFill>
                 <a:gsLst>
                   <a:gs pos="0">
@@ -16804,15 +16617,7 @@
           <a:p>
             <a:r>
               <a:rPr lang="en-US" dirty="0"/>
-              <a:t>Click to edit Master </a:t>
-            </a:r>
-            <a:r>
-              <a:rPr lang="en-US" dirty="0" smtClean="0"/>
-              <a:t>subtitle </a:t>
-            </a:r>
-            <a:r>
-              <a:rPr lang="en-US" dirty="0"/>
-              <a:t>style</a:t>
+              <a:t>Click to edit Master subtitle style</a:t>
             </a:r>
           </a:p>
         </p:txBody>
@@ -16854,7 +16659,7 @@
             <a:fld id="{1C2D31DE-C454-491C-B5C3-F097855E3DF7}" type="datetime4">
               <a:rPr lang="en-US" smtClean="0"/>
               <a:pPr/>
-              <a:t>March 24, 2020</a:t>
+              <a:t>September 6, 2022</a:t>
             </a:fld>
             <a:endParaRPr lang="en-US" dirty="0"/>
           </a:p>
@@ -19936,17 +19741,16 @@
           <a:p>
             <a:pPr lvl="0"/>
             <a:r>
-              <a:rPr lang="en-US" dirty="0" smtClean="0"/>
+              <a:rPr lang="en-US" dirty="0"/>
               <a:t>Presenter Name</a:t>
             </a:r>
             <a:br>
-              <a:rPr lang="en-US" dirty="0" smtClean="0"/>
+              <a:rPr lang="en-US" dirty="0"/>
             </a:br>
             <a:r>
-              <a:rPr lang="en-US" dirty="0" smtClean="0"/>
+              <a:rPr lang="en-US" dirty="0"/>
               <a:t>Presenter Title</a:t>
             </a:r>
-            <a:endParaRPr lang="en-US" dirty="0"/>
           </a:p>
         </p:txBody>
       </p:sp>
@@ -19963,13 +19767,6 @@
   <p:transition>
     <p:fade/>
   </p:transition>
-  <p:timing>
-    <p:tnLst>
-      <p:par>
-        <p:cTn id="1" dur="indefinite" restart="never" nodeType="tmRoot"/>
-      </p:par>
-    </p:tnLst>
-  </p:timing>
   <p:hf sldNum="0" hdr="0" ftr="0"/>
 </p:sldLayout>
 </file>
@@ -27479,10 +27276,9 @@
           <a:p>
             <a:pPr lvl="0"/>
             <a:r>
-              <a:rPr lang="en-US" dirty="0" smtClean="0"/>
+              <a:rPr lang="en-US" dirty="0"/>
               <a:t>&lt;Call to action&gt;</a:t>
             </a:r>
-            <a:endParaRPr lang="en-US" dirty="0"/>
           </a:p>
         </p:txBody>
       </p:sp>
@@ -29099,7 +28895,7 @@
           <a:p>
             <a:fld id="{5958763E-B898-436D-883D-03711491D54A}" type="datetimeFigureOut">
               <a:rPr lang="en-US" smtClean="0"/>
-              <a:t>3/24/2020</a:t>
+              <a:t>9/6/2022</a:t>
             </a:fld>
             <a:endParaRPr lang="en-US"/>
           </a:p>
@@ -29226,7 +29022,7 @@
                 <a:spcPct val="0"/>
               </a:spcAft>
             </a:pPr>
-            <a:endParaRPr lang="en-US" sz="2400" dirty="0" err="1" smtClean="0">
+            <a:endParaRPr lang="en-US" sz="2400" dirty="0" err="1">
               <a:gradFill>
                 <a:gsLst>
                   <a:gs pos="0">
@@ -29257,13 +29053,6 @@
   <p:transition>
     <p:fade/>
   </p:transition>
-  <p:timing>
-    <p:tnLst>
-      <p:par>
-        <p:cTn id="1" dur="indefinite" restart="never" nodeType="tmRoot"/>
-      </p:par>
-    </p:tnLst>
-  </p:timing>
 </p:sldLayout>
 </file>
 
@@ -29508,7 +29297,7 @@
           <a:p>
             <a:fld id="{5958763E-B898-436D-883D-03711491D54A}" type="datetimeFigureOut">
               <a:rPr lang="en-US" smtClean="0"/>
-              <a:t>3/24/2020</a:t>
+              <a:t>9/6/2022</a:t>
             </a:fld>
             <a:endParaRPr lang="en-US"/>
           </a:p>
@@ -29581,13 +29370,6 @@
   <p:transition>
     <p:fade/>
   </p:transition>
-  <p:timing>
-    <p:tnLst>
-      <p:par>
-        <p:cTn id="1" dur="indefinite" restart="never" nodeType="tmRoot"/>
-      </p:par>
-    </p:tnLst>
-  </p:timing>
 </p:sldLayout>
 </file>
 
@@ -29809,7 +29591,7 @@
           <a:p>
             <a:fld id="{5958763E-B898-436D-883D-03711491D54A}" type="datetimeFigureOut">
               <a:rPr lang="en-US" smtClean="0"/>
-              <a:t>3/24/2020</a:t>
+              <a:t>9/6/2022</a:t>
             </a:fld>
             <a:endParaRPr lang="en-US"/>
           </a:p>
@@ -29882,13 +29664,6 @@
   <p:transition>
     <p:fade/>
   </p:transition>
-  <p:timing>
-    <p:tnLst>
-      <p:par>
-        <p:cTn id="1" dur="indefinite" restart="never" nodeType="tmRoot"/>
-      </p:par>
-    </p:tnLst>
-  </p:timing>
 </p:sldLayout>
 </file>
 
@@ -30017,7 +29792,7 @@
           <a:p>
             <a:fld id="{5958763E-B898-436D-883D-03711491D54A}" type="datetimeFigureOut">
               <a:rPr lang="en-US" smtClean="0"/>
-              <a:t>3/24/2020</a:t>
+              <a:t>9/6/2022</a:t>
             </a:fld>
             <a:endParaRPr lang="en-US"/>
           </a:p>
@@ -30140,13 +29915,6 @@
   <p:transition>
     <p:fade/>
   </p:transition>
-  <p:timing>
-    <p:tnLst>
-      <p:par>
-        <p:cTn id="1" dur="indefinite" restart="never" nodeType="tmRoot"/>
-      </p:par>
-    </p:tnLst>
-  </p:timing>
 </p:sldLayout>
 </file>
 
@@ -30285,7 +30053,7 @@
           <a:p>
             <a:fld id="{5958763E-B898-436D-883D-03711491D54A}" type="datetimeFigureOut">
               <a:rPr lang="en-US" smtClean="0"/>
-              <a:t>3/24/2020</a:t>
+              <a:t>9/6/2022</a:t>
             </a:fld>
             <a:endParaRPr lang="en-US"/>
           </a:p>
@@ -30412,13 +30180,6 @@
   <p:transition>
     <p:fade/>
   </p:transition>
-  <p:timing>
-    <p:tnLst>
-      <p:par>
-        <p:cTn id="1" dur="indefinite" restart="never" nodeType="tmRoot"/>
-      </p:par>
-    </p:tnLst>
-  </p:timing>
 </p:sldLayout>
 </file>
 
@@ -30580,7 +30341,7 @@
                 <a:spcPct val="0"/>
               </a:spcAft>
             </a:pPr>
-            <a:endParaRPr lang="en-US" sz="2400" dirty="0" err="1" smtClean="0">
+            <a:endParaRPr lang="en-US" sz="2400" dirty="0" err="1">
               <a:gradFill>
                 <a:gsLst>
                   <a:gs pos="0">
@@ -30631,10 +30392,9 @@
           </a:lstStyle>
           <a:p>
             <a:r>
-              <a:rPr lang="en-US" dirty="0" smtClean="0"/>
+              <a:rPr lang="en-US" dirty="0"/>
               <a:t>Type “Agenda”</a:t>
             </a:r>
-            <a:endParaRPr lang="en-US" dirty="0"/>
           </a:p>
         </p:txBody>
       </p:sp>
@@ -30758,24 +30518,23 @@
           <a:p>
             <a:pPr lvl="0"/>
             <a:r>
-              <a:rPr lang="en-US" dirty="0" smtClean="0"/>
+              <a:rPr lang="en-US" dirty="0"/>
               <a:t>Item 1</a:t>
             </a:r>
           </a:p>
           <a:p>
             <a:pPr lvl="0"/>
             <a:r>
-              <a:rPr lang="en-US" dirty="0" smtClean="0"/>
+              <a:rPr lang="en-US" dirty="0"/>
               <a:t>Item 2</a:t>
             </a:r>
           </a:p>
           <a:p>
             <a:pPr lvl="0"/>
             <a:r>
-              <a:rPr lang="en-US" dirty="0" smtClean="0"/>
+              <a:rPr lang="en-US" dirty="0"/>
               <a:t>Item 3</a:t>
             </a:r>
-            <a:endParaRPr lang="en-US" dirty="0"/>
           </a:p>
         </p:txBody>
       </p:sp>
@@ -30802,7 +30561,7 @@
           <a:p>
             <a:fld id="{5958763E-B898-436D-883D-03711491D54A}" type="datetimeFigureOut">
               <a:rPr lang="en-US" smtClean="0"/>
-              <a:t>3/24/2020</a:t>
+              <a:t>9/6/2022</a:t>
             </a:fld>
             <a:endParaRPr lang="en-US"/>
           </a:p>
@@ -30909,13 +30668,6 @@
   <p:transition>
     <p:fade/>
   </p:transition>
-  <p:timing>
-    <p:tnLst>
-      <p:par>
-        <p:cTn id="1" dur="indefinite" restart="never" nodeType="tmRoot"/>
-      </p:par>
-    </p:tnLst>
-  </p:timing>
 </p:sldLayout>
 </file>
 
@@ -31077,7 +30829,7 @@
                 <a:spcPct val="0"/>
               </a:spcAft>
             </a:pPr>
-            <a:endParaRPr lang="en-US" sz="2400" dirty="0" err="1" smtClean="0">
+            <a:endParaRPr lang="en-US" sz="2400" dirty="0" err="1">
               <a:gradFill>
                 <a:gsLst>
                   <a:gs pos="0">
@@ -31130,10 +30882,9 @@
           </a:lstStyle>
           <a:p>
             <a:r>
-              <a:rPr lang="en-US" dirty="0" smtClean="0"/>
+              <a:rPr lang="en-US" dirty="0"/>
               <a:t>Notable Quote</a:t>
             </a:r>
-            <a:endParaRPr lang="en-US" dirty="0"/>
           </a:p>
         </p:txBody>
       </p:sp>
@@ -31260,10 +31011,9 @@
           <a:p>
             <a:pPr lvl="0"/>
             <a:r>
-              <a:rPr lang="en-US" dirty="0" smtClean="0"/>
+              <a:rPr lang="en-US" dirty="0"/>
               <a:t>– Attribution</a:t>
             </a:r>
-            <a:endParaRPr lang="en-US" dirty="0"/>
           </a:p>
         </p:txBody>
       </p:sp>
@@ -31290,7 +31040,7 @@
           <a:p>
             <a:fld id="{5958763E-B898-436D-883D-03711491D54A}" type="datetimeFigureOut">
               <a:rPr lang="en-US" smtClean="0"/>
-              <a:t>3/24/2020</a:t>
+              <a:t>9/6/2022</a:t>
             </a:fld>
             <a:endParaRPr lang="en-US"/>
           </a:p>
@@ -32038,13 +31788,6 @@
   <p:transition>
     <p:fade/>
   </p:transition>
-  <p:timing>
-    <p:tnLst>
-      <p:par>
-        <p:cTn id="1" dur="indefinite" restart="never" nodeType="tmRoot"/>
-      </p:par>
-    </p:tnLst>
-  </p:timing>
 </p:sldLayout>
 </file>
 
@@ -32116,7 +31859,7 @@
           <a:p>
             <a:fld id="{5958763E-B898-436D-883D-03711491D54A}" type="datetimeFigureOut">
               <a:rPr lang="en-US" smtClean="0"/>
-              <a:t>3/24/2020</a:t>
+              <a:t>9/6/2022</a:t>
             </a:fld>
             <a:endParaRPr lang="en-US"/>
           </a:p>
@@ -32189,13 +31932,6 @@
   <p:transition>
     <p:fade/>
   </p:transition>
-  <p:timing>
-    <p:tnLst>
-      <p:par>
-        <p:cTn id="1" dur="indefinite" restart="never" nodeType="tmRoot"/>
-      </p:par>
-    </p:tnLst>
-  </p:timing>
 </p:sldLayout>
 </file>
 
@@ -32324,7 +32060,7 @@
           <a:p>
             <a:fld id="{5958763E-B898-436D-883D-03711491D54A}" type="datetimeFigureOut">
               <a:rPr lang="en-US" smtClean="0"/>
-              <a:t>3/24/2020</a:t>
+              <a:t>9/6/2022</a:t>
             </a:fld>
             <a:endParaRPr lang="en-US"/>
           </a:p>
@@ -32447,13 +32183,6 @@
   <p:transition>
     <p:fade/>
   </p:transition>
-  <p:timing>
-    <p:tnLst>
-      <p:par>
-        <p:cTn id="1" dur="indefinite" restart="never" nodeType="tmRoot"/>
-      </p:par>
-    </p:tnLst>
-  </p:timing>
 </p:sldLayout>
 </file>
 
@@ -32666,7 +32395,7 @@
           <a:p>
             <a:fld id="{5958763E-B898-436D-883D-03711491D54A}" type="datetimeFigureOut">
               <a:rPr lang="en-US" smtClean="0"/>
-              <a:t>3/24/2020</a:t>
+              <a:t>9/6/2022</a:t>
             </a:fld>
             <a:endParaRPr lang="en-US"/>
           </a:p>
@@ -32739,13 +32468,6 @@
   <p:transition>
     <p:fade/>
   </p:transition>
-  <p:timing>
-    <p:tnLst>
-      <p:par>
-        <p:cTn id="1" dur="indefinite" restart="never" nodeType="tmRoot"/>
-      </p:par>
-    </p:tnLst>
-  </p:timing>
 </p:sldLayout>
 </file>
 
@@ -32903,7 +32625,7 @@
           <a:p>
             <a:fld id="{5958763E-B898-436D-883D-03711491D54A}" type="datetimeFigureOut">
               <a:rPr lang="en-US" smtClean="0"/>
-              <a:t>3/24/2020</a:t>
+              <a:t>9/6/2022</a:t>
             </a:fld>
             <a:endParaRPr lang="en-US"/>
           </a:p>
@@ -32976,13 +32698,6 @@
   <p:transition>
     <p:fade/>
   </p:transition>
-  <p:timing>
-    <p:tnLst>
-      <p:par>
-        <p:cTn id="1" dur="indefinite" restart="never" nodeType="tmRoot"/>
-      </p:par>
-    </p:tnLst>
-  </p:timing>
 </p:sldLayout>
 </file>
 
@@ -33154,7 +32869,7 @@
           <a:p>
             <a:fld id="{5958763E-B898-436D-883D-03711491D54A}" type="datetimeFigureOut">
               <a:rPr lang="en-US" smtClean="0"/>
-              <a:t>3/24/2020</a:t>
+              <a:t>9/6/2022</a:t>
             </a:fld>
             <a:endParaRPr lang="en-US"/>
           </a:p>
@@ -33300,13 +33015,6 @@
   <p:transition>
     <p:fade/>
   </p:transition>
-  <p:timing>
-    <p:tnLst>
-      <p:par>
-        <p:cTn id="1" dur="indefinite" restart="never" nodeType="tmRoot"/>
-      </p:par>
-    </p:tnLst>
-  </p:timing>
   <p:txStyles>
     <p:titleStyle>
       <a:lvl1pPr algn="l" defTabSz="914400" rtl="0" eaLnBrk="1" latinLnBrk="0" hangingPunct="1">
@@ -33611,7 +33319,7 @@
       </a:lvl9pPr>
     </p:otherStyle>
   </p:txStyles>
-  <p:extLst mod="1">
+  <p:extLst>
     <p:ext uri="{27BBF7A9-308A-43DC-89C8-2F10F3537804}">
       <p15:sldGuideLst xmlns:p15="http://schemas.microsoft.com/office/powerpoint/2012/main">
         <p15:guide id="1" orient="horz" pos="2160" userDrawn="1">
@@ -33690,10 +33398,9 @@
           <a:lstStyle/>
           <a:p>
             <a:r>
-              <a:rPr lang="en-US" sz="6600" dirty="0" smtClean="0"/>
+              <a:rPr lang="en-US" sz="6600" dirty="0"/>
               <a:t>Data Review Activity</a:t>
             </a:r>
-            <a:endParaRPr lang="en-US" sz="6600" dirty="0"/>
           </a:p>
         </p:txBody>
       </p:sp>
@@ -33718,11 +33425,11 @@
           <a:lstStyle/>
           <a:p>
             <a:r>
-              <a:rPr lang="en-US" dirty="0" smtClean="0"/>
+              <a:rPr lang="en-US" dirty="0"/>
               <a:t>Hy-Tech Club: </a:t>
             </a:r>
             <a:r>
-              <a:rPr lang="en-US" smtClean="0"/>
+              <a:rPr lang="en-US"/>
               <a:t>Web 102</a:t>
             </a:r>
             <a:endParaRPr lang="en-US" dirty="0"/>
@@ -36710,13 +36417,6 @@
   <p:transition>
     <p:fade/>
   </p:transition>
-  <p:timing>
-    <p:tnLst>
-      <p:par>
-        <p:cTn id="1" dur="indefinite" restart="never" nodeType="tmRoot"/>
-      </p:par>
-    </p:tnLst>
-  </p:timing>
 </p:sld>
 </file>
 
@@ -36753,10 +36453,9 @@
           <a:lstStyle/>
           <a:p>
             <a:r>
-              <a:rPr lang="en-US" dirty="0" smtClean="0"/>
+              <a:rPr lang="en-US" dirty="0"/>
               <a:t>What’s the data type?</a:t>
             </a:r>
-            <a:endParaRPr lang="en-US" dirty="0"/>
           </a:p>
         </p:txBody>
       </p:sp>
@@ -36781,7 +36480,7 @@
               <a:buNone/>
             </a:pPr>
             <a:r>
-              <a:rPr lang="en-US" sz="9600" dirty="0" smtClean="0">
+              <a:rPr lang="en-US" sz="9600" dirty="0">
                 <a:solidFill>
                   <a:srgbClr val="A31515"/>
                 </a:solidFill>
@@ -36847,10 +36546,9 @@
           <a:lstStyle/>
           <a:p>
             <a:r>
-              <a:rPr lang="en-US" dirty="0" smtClean="0"/>
+              <a:rPr lang="en-US" dirty="0"/>
               <a:t>What’s the data type?</a:t>
             </a:r>
-            <a:endParaRPr lang="en-US" dirty="0"/>
           </a:p>
         </p:txBody>
       </p:sp>
@@ -37047,7 +36745,7 @@
                 <a:spcPct val="0"/>
               </a:spcAft>
             </a:pPr>
-            <a:endParaRPr lang="en-US" sz="2400" dirty="0" err="1" smtClean="0">
+            <a:endParaRPr lang="en-US" sz="2400" dirty="0" err="1">
               <a:gradFill>
                 <a:gsLst>
                   <a:gs pos="0">
@@ -37114,10 +36812,9 @@
           <a:lstStyle/>
           <a:p>
             <a:r>
-              <a:rPr lang="en-US" dirty="0" smtClean="0"/>
+              <a:rPr lang="en-US" dirty="0"/>
               <a:t>What’s the data type?</a:t>
             </a:r>
-            <a:endParaRPr lang="en-US" dirty="0"/>
           </a:p>
         </p:txBody>
       </p:sp>
@@ -37314,7 +37011,7 @@
                 <a:spcPct val="0"/>
               </a:spcAft>
             </a:pPr>
-            <a:endParaRPr lang="en-US" sz="2400" dirty="0" err="1" smtClean="0">
+            <a:endParaRPr lang="en-US" sz="2400" dirty="0" err="1">
               <a:gradFill>
                 <a:gsLst>
                   <a:gs pos="0">
@@ -37386,10 +37083,9 @@
           <a:lstStyle/>
           <a:p>
             <a:r>
-              <a:rPr lang="en-US" dirty="0" smtClean="0"/>
+              <a:rPr lang="en-US" dirty="0"/>
               <a:t>values</a:t>
             </a:r>
-            <a:endParaRPr lang="en-US" dirty="0"/>
           </a:p>
         </p:txBody>
       </p:sp>
@@ -37442,11 +37138,11 @@
           <a:lstStyle/>
           <a:p>
             <a:r>
-              <a:rPr lang="en-US" dirty="0" smtClean="0"/>
+              <a:rPr lang="en-US" dirty="0"/>
               <a:t>What is the value of the variable </a:t>
             </a:r>
             <a:r>
-              <a:rPr lang="en-US" sz="4000" cap="none" dirty="0" smtClean="0">
+              <a:rPr lang="en-US" sz="4000" cap="none" dirty="0">
                 <a:solidFill>
                   <a:schemeClr val="accent1">
                     <a:lumMod val="20000"/>
@@ -37458,10 +37154,9 @@
               <a:t>x</a:t>
             </a:r>
             <a:r>
-              <a:rPr lang="en-US" dirty="0" smtClean="0"/>
+              <a:rPr lang="en-US" dirty="0"/>
               <a:t>?</a:t>
             </a:r>
-            <a:endParaRPr lang="en-US" dirty="0"/>
           </a:p>
         </p:txBody>
       </p:sp>
@@ -37489,13 +37184,13 @@
               <a:buNone/>
             </a:pPr>
             <a:r>
-              <a:rPr lang="en-US" sz="8000" dirty="0" err="1">
+              <a:rPr lang="en-US" sz="8000" dirty="0">
                 <a:solidFill>
                   <a:srgbClr val="0000FF"/>
                 </a:solidFill>
                 <a:latin typeface="Consolas" panose="020B0609020204030204" pitchFamily="49" charset="0"/>
               </a:rPr>
-              <a:t>var</a:t>
+              <a:t>let</a:t>
             </a:r>
             <a:r>
               <a:rPr lang="en-US" sz="8000" dirty="0">
@@ -37593,7 +37288,7 @@
               <a:t>100</a:t>
             </a:r>
             <a:r>
-              <a:rPr lang="en-US" sz="8000" dirty="0" smtClean="0">
+              <a:rPr lang="en-US" sz="8000" dirty="0">
                 <a:solidFill>
                   <a:srgbClr val="000000"/>
                 </a:solidFill>
@@ -37601,12 +37296,6 @@
               </a:rPr>
               <a:t>;</a:t>
             </a:r>
-            <a:endParaRPr lang="en-US" sz="8000" dirty="0">
-              <a:solidFill>
-                <a:srgbClr val="000000"/>
-              </a:solidFill>
-              <a:latin typeface="Consolas" panose="020B0609020204030204" pitchFamily="49" charset="0"/>
-            </a:endParaRPr>
           </a:p>
         </p:txBody>
       </p:sp>
@@ -37659,11 +37348,11 @@
           <a:lstStyle/>
           <a:p>
             <a:r>
-              <a:rPr lang="en-US" dirty="0" smtClean="0"/>
+              <a:rPr lang="en-US" dirty="0"/>
               <a:t>What is the value of the variable </a:t>
             </a:r>
             <a:r>
-              <a:rPr lang="en-US" sz="4000" cap="none" dirty="0" smtClean="0">
+              <a:rPr lang="en-US" sz="4000" cap="none" dirty="0">
                 <a:solidFill>
                   <a:schemeClr val="accent1">
                     <a:lumMod val="20000"/>
@@ -37675,10 +37364,9 @@
               <a:t>x</a:t>
             </a:r>
             <a:r>
-              <a:rPr lang="en-US" dirty="0" smtClean="0"/>
+              <a:rPr lang="en-US" dirty="0"/>
               <a:t>?</a:t>
             </a:r>
-            <a:endParaRPr lang="en-US" dirty="0"/>
           </a:p>
         </p:txBody>
       </p:sp>
@@ -37706,13 +37394,13 @@
               <a:buNone/>
             </a:pPr>
             <a:r>
-              <a:rPr lang="en-US" sz="8000" dirty="0" err="1">
+              <a:rPr lang="en-US" sz="8000" dirty="0">
                 <a:solidFill>
                   <a:srgbClr val="0000FF"/>
                 </a:solidFill>
                 <a:latin typeface="Consolas" panose="020B0609020204030204" pitchFamily="49" charset="0"/>
               </a:rPr>
-              <a:t>var</a:t>
+              <a:t>let</a:t>
             </a:r>
             <a:r>
               <a:rPr lang="en-US" sz="8000" dirty="0">
@@ -37810,7 +37498,7 @@
               <a:t>18</a:t>
             </a:r>
             <a:r>
-              <a:rPr lang="en-US" sz="8000" dirty="0" smtClean="0">
+              <a:rPr lang="en-US" sz="8000" dirty="0">
                 <a:solidFill>
                   <a:srgbClr val="000000"/>
                 </a:solidFill>
@@ -37818,12 +37506,6 @@
               </a:rPr>
               <a:t>;</a:t>
             </a:r>
-            <a:endParaRPr lang="en-US" sz="8000" dirty="0">
-              <a:solidFill>
-                <a:srgbClr val="000000"/>
-              </a:solidFill>
-              <a:latin typeface="Consolas" panose="020B0609020204030204" pitchFamily="49" charset="0"/>
-            </a:endParaRPr>
           </a:p>
         </p:txBody>
       </p:sp>
@@ -37876,11 +37558,11 @@
           <a:lstStyle/>
           <a:p>
             <a:r>
-              <a:rPr lang="en-US" dirty="0" smtClean="0"/>
+              <a:rPr lang="en-US" dirty="0"/>
               <a:t>What is the value of the variable </a:t>
             </a:r>
             <a:r>
-              <a:rPr lang="en-US" sz="4000" cap="none" dirty="0" smtClean="0">
+              <a:rPr lang="en-US" sz="4000" cap="none" dirty="0">
                 <a:solidFill>
                   <a:schemeClr val="accent1">
                     <a:lumMod val="20000"/>
@@ -37892,10 +37574,9 @@
               <a:t>x</a:t>
             </a:r>
             <a:r>
-              <a:rPr lang="en-US" dirty="0" smtClean="0"/>
+              <a:rPr lang="en-US" dirty="0"/>
               <a:t>?</a:t>
             </a:r>
-            <a:endParaRPr lang="en-US" dirty="0"/>
           </a:p>
         </p:txBody>
       </p:sp>
@@ -37923,13 +37604,13 @@
               <a:buNone/>
             </a:pPr>
             <a:r>
-              <a:rPr lang="en-US" sz="8000" dirty="0" err="1">
+              <a:rPr lang="en-US" sz="8000" dirty="0">
                 <a:solidFill>
                   <a:srgbClr val="0000FF"/>
                 </a:solidFill>
                 <a:latin typeface="Consolas" panose="020B0609020204030204" pitchFamily="49" charset="0"/>
               </a:rPr>
-              <a:t>var</a:t>
+              <a:t>let</a:t>
             </a:r>
             <a:r>
               <a:rPr lang="en-US" sz="8000" dirty="0">
@@ -38096,10 +37777,9 @@
           <a:lstStyle/>
           <a:p>
             <a:r>
-              <a:rPr lang="en-US" dirty="0" smtClean="0"/>
+              <a:rPr lang="en-US" dirty="0"/>
               <a:t>Data types</a:t>
             </a:r>
-            <a:endParaRPr lang="en-US" dirty="0"/>
           </a:p>
         </p:txBody>
       </p:sp>
@@ -38152,10 +37832,9 @@
           <a:lstStyle/>
           <a:p>
             <a:r>
-              <a:rPr lang="en-US" dirty="0" smtClean="0"/>
+              <a:rPr lang="en-US" dirty="0"/>
               <a:t>What’s the data type?</a:t>
             </a:r>
-            <a:endParaRPr lang="en-US" dirty="0"/>
           </a:p>
         </p:txBody>
       </p:sp>
@@ -38180,10 +37859,9 @@
               <a:buNone/>
             </a:pPr>
             <a:r>
-              <a:rPr lang="en-US" sz="16600" dirty="0" smtClean="0"/>
+              <a:rPr lang="en-US" sz="16600" dirty="0"/>
               <a:t>4</a:t>
             </a:r>
-            <a:endParaRPr lang="en-US" sz="16600" dirty="0"/>
           </a:p>
         </p:txBody>
       </p:sp>
@@ -38236,10 +37914,9 @@
           <a:lstStyle/>
           <a:p>
             <a:r>
-              <a:rPr lang="en-US" dirty="0" smtClean="0"/>
+              <a:rPr lang="en-US" dirty="0"/>
               <a:t>What’s the data type?</a:t>
             </a:r>
-            <a:endParaRPr lang="en-US" dirty="0"/>
           </a:p>
         </p:txBody>
       </p:sp>
@@ -38264,10 +37941,9 @@
               <a:buNone/>
             </a:pPr>
             <a:r>
-              <a:rPr lang="en-US" sz="16600" dirty="0" smtClean="0"/>
+              <a:rPr lang="en-US" sz="16600" dirty="0"/>
               <a:t>12.2</a:t>
             </a:r>
-            <a:endParaRPr lang="en-US" sz="16600" dirty="0"/>
           </a:p>
         </p:txBody>
       </p:sp>
@@ -38320,10 +37996,9 @@
           <a:lstStyle/>
           <a:p>
             <a:r>
-              <a:rPr lang="en-US" dirty="0" smtClean="0"/>
+              <a:rPr lang="en-US" dirty="0"/>
               <a:t>What’s the data type?</a:t>
             </a:r>
-            <a:endParaRPr lang="en-US" dirty="0"/>
           </a:p>
         </p:txBody>
       </p:sp>
@@ -38354,16 +38029,7 @@
                 </a:solidFill>
                 <a:latin typeface="Consolas" panose="020B0609020204030204" pitchFamily="49" charset="0"/>
               </a:rPr>
-              <a:t>"Despicable Me</a:t>
-            </a:r>
-            <a:r>
-              <a:rPr lang="en-US" sz="9600" dirty="0" smtClean="0">
-                <a:solidFill>
-                  <a:srgbClr val="A31515"/>
-                </a:solidFill>
-                <a:latin typeface="Consolas" panose="020B0609020204030204" pitchFamily="49" charset="0"/>
-              </a:rPr>
-              <a:t>"</a:t>
+              <a:t>"Despicable Me"</a:t>
             </a:r>
             <a:endParaRPr lang="en-US" sz="9600" dirty="0">
               <a:solidFill>
@@ -38423,10 +38089,9 @@
           <a:lstStyle/>
           <a:p>
             <a:r>
-              <a:rPr lang="en-US" dirty="0" smtClean="0"/>
+              <a:rPr lang="en-US" dirty="0"/>
               <a:t>What’s the data type?</a:t>
             </a:r>
-            <a:endParaRPr lang="en-US" dirty="0"/>
           </a:p>
         </p:txBody>
       </p:sp>
@@ -38451,10 +38116,9 @@
               <a:buNone/>
             </a:pPr>
             <a:r>
-              <a:rPr lang="en-US" sz="16600" dirty="0" smtClean="0"/>
+              <a:rPr lang="en-US" sz="16600" dirty="0"/>
               <a:t>-40042</a:t>
             </a:r>
-            <a:endParaRPr lang="en-US" sz="16600" dirty="0"/>
           </a:p>
         </p:txBody>
       </p:sp>
@@ -38507,10 +38171,9 @@
           <a:lstStyle/>
           <a:p>
             <a:r>
-              <a:rPr lang="en-US" dirty="0" smtClean="0"/>
+              <a:rPr lang="en-US" dirty="0"/>
               <a:t>What’s the data type?</a:t>
             </a:r>
-            <a:endParaRPr lang="en-US" dirty="0"/>
           </a:p>
         </p:txBody>
       </p:sp>
@@ -38535,7 +38198,7 @@
               <a:buNone/>
             </a:pPr>
             <a:r>
-              <a:rPr lang="en-US" sz="9600" dirty="0" smtClean="0">
+              <a:rPr lang="en-US" sz="9600" dirty="0">
                 <a:solidFill>
                   <a:srgbClr val="A31515"/>
                 </a:solidFill>
@@ -38601,10 +38264,9 @@
           <a:lstStyle/>
           <a:p>
             <a:r>
-              <a:rPr lang="en-US" dirty="0" smtClean="0"/>
+              <a:rPr lang="en-US" dirty="0"/>
               <a:t>What’s the data type?</a:t>
             </a:r>
-            <a:endParaRPr lang="en-US" dirty="0"/>
           </a:p>
         </p:txBody>
       </p:sp>
@@ -38629,10 +38291,9 @@
               <a:buNone/>
             </a:pPr>
             <a:r>
-              <a:rPr lang="en-US" sz="16600" dirty="0" smtClean="0"/>
+              <a:rPr lang="en-US" sz="16600" dirty="0"/>
               <a:t>9 + 6</a:t>
             </a:r>
-            <a:endParaRPr lang="en-US" sz="16600" dirty="0"/>
           </a:p>
         </p:txBody>
       </p:sp>
@@ -38685,10 +38346,9 @@
           <a:lstStyle/>
           <a:p>
             <a:r>
-              <a:rPr lang="en-US" dirty="0" smtClean="0"/>
+              <a:rPr lang="en-US" dirty="0"/>
               <a:t>What’s the data type?</a:t>
             </a:r>
-            <a:endParaRPr lang="en-US" dirty="0"/>
           </a:p>
         </p:txBody>
       </p:sp>
@@ -38713,7 +38373,7 @@
               <a:buNone/>
             </a:pPr>
             <a:r>
-              <a:rPr lang="en-US" sz="9600" dirty="0" smtClean="0">
+              <a:rPr lang="en-US" sz="9600" dirty="0">
                 <a:solidFill>
                   <a:srgbClr val="A31515"/>
                 </a:solidFill>

</xml_diff>

<commit_message>
Update gitbook 2022-09-06 17:14:17
</commit_message>
<xml_diff>
--- a/Week03/Review.pptx
+++ b/Week03/Review.pptx
@@ -223,7 +223,7 @@
           <a:p>
             <a:fld id="{19104133-B5B0-4351-8158-4F0E5EB1E2BF}" type="datetimeFigureOut">
               <a:rPr lang="en-US" smtClean="0"/>
-              <a:t>3/24/2020</a:t>
+              <a:t>9/6/2022</a:t>
             </a:fld>
             <a:endParaRPr lang="en-US"/>
           </a:p>
@@ -287,38 +287,37 @@
           <a:p>
             <a:pPr lvl="0"/>
             <a:r>
-              <a:rPr lang="en-US" smtClean="0"/>
+              <a:rPr lang="en-US"/>
               <a:t>Edit Master text styles</a:t>
             </a:r>
           </a:p>
           <a:p>
             <a:pPr lvl="1"/>
             <a:r>
-              <a:rPr lang="en-US" smtClean="0"/>
+              <a:rPr lang="en-US"/>
               <a:t>Second level</a:t>
             </a:r>
           </a:p>
           <a:p>
             <a:pPr lvl="2"/>
             <a:r>
-              <a:rPr lang="en-US" smtClean="0"/>
+              <a:rPr lang="en-US"/>
               <a:t>Third level</a:t>
             </a:r>
           </a:p>
           <a:p>
             <a:pPr lvl="3"/>
             <a:r>
-              <a:rPr lang="en-US" smtClean="0"/>
+              <a:rPr lang="en-US"/>
               <a:t>Fourth level</a:t>
             </a:r>
           </a:p>
           <a:p>
             <a:pPr lvl="4"/>
             <a:r>
-              <a:rPr lang="en-US" smtClean="0"/>
+              <a:rPr lang="en-US"/>
               <a:t>Fifth level</a:t>
             </a:r>
-            <a:endParaRPr lang="en-US"/>
           </a:p>
         </p:txBody>
       </p:sp>
@@ -536,10 +535,9 @@
           <a:lstStyle/>
           <a:p>
             <a:r>
-              <a:rPr lang="en-US" dirty="0" smtClean="0"/>
+              <a:rPr lang="en-US" dirty="0"/>
               <a:t>number</a:t>
             </a:r>
-            <a:endParaRPr lang="en-US" dirty="0"/>
           </a:p>
         </p:txBody>
       </p:sp>
@@ -624,10 +622,9 @@
           <a:lstStyle/>
           <a:p>
             <a:r>
-              <a:rPr lang="en-US" dirty="0" smtClean="0"/>
+              <a:rPr lang="en-US" dirty="0"/>
               <a:t>string</a:t>
             </a:r>
-            <a:endParaRPr lang="en-US" dirty="0"/>
           </a:p>
         </p:txBody>
       </p:sp>
@@ -712,10 +709,9 @@
           <a:lstStyle/>
           <a:p>
             <a:r>
-              <a:rPr lang="en-US" dirty="0" smtClean="0"/>
+              <a:rPr lang="en-US" dirty="0"/>
               <a:t>120</a:t>
             </a:r>
-            <a:endParaRPr lang="en-US" dirty="0"/>
           </a:p>
         </p:txBody>
       </p:sp>
@@ -800,10 +796,9 @@
           <a:lstStyle/>
           <a:p>
             <a:r>
-              <a:rPr lang="en-US" dirty="0" smtClean="0"/>
+              <a:rPr lang="en-US" dirty="0"/>
               <a:t>‘2018’</a:t>
             </a:r>
-            <a:endParaRPr lang="en-US" dirty="0"/>
           </a:p>
         </p:txBody>
       </p:sp>
@@ -888,10 +883,9 @@
           <a:lstStyle/>
           <a:p>
             <a:r>
-              <a:rPr lang="en-US" dirty="0" smtClean="0"/>
+              <a:rPr lang="en-US" dirty="0"/>
               <a:t>9.5</a:t>
             </a:r>
-            <a:endParaRPr lang="en-US" dirty="0"/>
           </a:p>
         </p:txBody>
       </p:sp>
@@ -976,10 +970,9 @@
           <a:lstStyle/>
           <a:p>
             <a:r>
-              <a:rPr lang="en-US" dirty="0" smtClean="0"/>
+              <a:rPr lang="en-US" dirty="0"/>
               <a:t>number</a:t>
             </a:r>
-            <a:endParaRPr lang="en-US" dirty="0"/>
           </a:p>
         </p:txBody>
       </p:sp>
@@ -1064,10 +1057,9 @@
           <a:lstStyle/>
           <a:p>
             <a:r>
-              <a:rPr lang="en-US" dirty="0" smtClean="0"/>
+              <a:rPr lang="en-US" dirty="0"/>
               <a:t>string</a:t>
             </a:r>
-            <a:endParaRPr lang="en-US" dirty="0"/>
           </a:p>
         </p:txBody>
       </p:sp>
@@ -1152,10 +1144,9 @@
           <a:lstStyle/>
           <a:p>
             <a:r>
-              <a:rPr lang="en-US" dirty="0" smtClean="0"/>
+              <a:rPr lang="en-US" dirty="0"/>
               <a:t>number</a:t>
             </a:r>
-            <a:endParaRPr lang="en-US" dirty="0"/>
           </a:p>
         </p:txBody>
       </p:sp>
@@ -1240,10 +1231,9 @@
           <a:lstStyle/>
           <a:p>
             <a:r>
-              <a:rPr lang="en-US" dirty="0" smtClean="0"/>
+              <a:rPr lang="en-US" dirty="0"/>
               <a:t>string</a:t>
             </a:r>
-            <a:endParaRPr lang="en-US" dirty="0"/>
           </a:p>
         </p:txBody>
       </p:sp>
@@ -1328,10 +1318,9 @@
           <a:lstStyle/>
           <a:p>
             <a:r>
-              <a:rPr lang="en-US" dirty="0" smtClean="0"/>
+              <a:rPr lang="en-US" dirty="0"/>
               <a:t>number</a:t>
             </a:r>
-            <a:endParaRPr lang="en-US" dirty="0"/>
           </a:p>
         </p:txBody>
       </p:sp>
@@ -1416,10 +1405,9 @@
           <a:lstStyle/>
           <a:p>
             <a:r>
-              <a:rPr lang="en-US" dirty="0" smtClean="0"/>
+              <a:rPr lang="en-US" dirty="0"/>
               <a:t>string</a:t>
             </a:r>
-            <a:endParaRPr lang="en-US" dirty="0"/>
           </a:p>
         </p:txBody>
       </p:sp>
@@ -1504,10 +1492,9 @@
           <a:lstStyle/>
           <a:p>
             <a:r>
-              <a:rPr lang="en-US" dirty="0" smtClean="0"/>
+              <a:rPr lang="en-US" dirty="0"/>
               <a:t>string</a:t>
             </a:r>
-            <a:endParaRPr lang="en-US" dirty="0"/>
           </a:p>
         </p:txBody>
       </p:sp>
@@ -1592,10 +1579,9 @@
           <a:lstStyle/>
           <a:p>
             <a:r>
-              <a:rPr lang="en-US" dirty="0" smtClean="0"/>
+              <a:rPr lang="en-US" dirty="0"/>
               <a:t>number</a:t>
             </a:r>
-            <a:endParaRPr lang="en-US" dirty="0"/>
           </a:p>
         </p:txBody>
       </p:sp>
@@ -1775,15 +1761,7 @@
           <a:p>
             <a:r>
               <a:rPr lang="en-US" dirty="0"/>
-              <a:t>Click to edit Master </a:t>
-            </a:r>
-            <a:r>
-              <a:rPr lang="en-US" dirty="0" smtClean="0"/>
-              <a:t>subtitle </a:t>
-            </a:r>
-            <a:r>
-              <a:rPr lang="en-US" dirty="0"/>
-              <a:t>style</a:t>
+              <a:t>Click to edit Master subtitle style</a:t>
             </a:r>
           </a:p>
         </p:txBody>
@@ -1825,7 +1803,7 @@
             <a:fld id="{1C2D31DE-C454-491C-B5C3-F097855E3DF7}" type="datetime4">
               <a:rPr lang="en-US" smtClean="0"/>
               <a:pPr/>
-              <a:t>March 24, 2020</a:t>
+              <a:t>September 6, 2022</a:t>
             </a:fld>
             <a:endParaRPr lang="en-US" dirty="0"/>
           </a:p>
@@ -4899,17 +4877,16 @@
           <a:p>
             <a:pPr lvl="0"/>
             <a:r>
-              <a:rPr lang="en-US" dirty="0" smtClean="0"/>
+              <a:rPr lang="en-US" dirty="0"/>
               <a:t>Presenter Name</a:t>
             </a:r>
             <a:br>
-              <a:rPr lang="en-US" dirty="0" smtClean="0"/>
+              <a:rPr lang="en-US" dirty="0"/>
             </a:br>
             <a:r>
-              <a:rPr lang="en-US" dirty="0" smtClean="0"/>
+              <a:rPr lang="en-US" dirty="0"/>
               <a:t>Presenter Title</a:t>
             </a:r>
-            <a:endParaRPr lang="en-US" dirty="0"/>
           </a:p>
         </p:txBody>
       </p:sp>
@@ -4926,13 +4903,6 @@
   <p:transition>
     <p:fade/>
   </p:transition>
-  <p:timing>
-    <p:tnLst>
-      <p:par>
-        <p:cTn id="1" dur="indefinite" restart="never" nodeType="tmRoot"/>
-      </p:par>
-    </p:tnLst>
-  </p:timing>
   <p:hf sldNum="0" hdr="0" ftr="0"/>
 </p:sldLayout>
 </file>
@@ -5225,7 +5195,7 @@
           <a:p>
             <a:fld id="{5958763E-B898-436D-883D-03711491D54A}" type="datetimeFigureOut">
               <a:rPr lang="en-US" smtClean="0"/>
-              <a:t>3/24/2020</a:t>
+              <a:t>9/6/2022</a:t>
             </a:fld>
             <a:endParaRPr lang="en-US"/>
           </a:p>
@@ -5298,13 +5268,6 @@
   <p:transition>
     <p:fade/>
   </p:transition>
-  <p:timing>
-    <p:tnLst>
-      <p:par>
-        <p:cTn id="1" dur="indefinite" restart="never" nodeType="tmRoot"/>
-      </p:par>
-    </p:tnLst>
-  </p:timing>
 </p:sldLayout>
 </file>
 
@@ -5353,10 +5316,9 @@
           </a:lstStyle>
           <a:p>
             <a:r>
-              <a:rPr lang="en-US" dirty="0" smtClean="0"/>
+              <a:rPr lang="en-US" dirty="0"/>
               <a:t>Click icon to add picture</a:t>
             </a:r>
-            <a:endParaRPr lang="en-US" dirty="0"/>
           </a:p>
         </p:txBody>
       </p:sp>
@@ -5426,7 +5388,7 @@
           <a:p>
             <a:fld id="{5958763E-B898-436D-883D-03711491D54A}" type="datetimeFigureOut">
               <a:rPr lang="en-US" smtClean="0"/>
-              <a:t>3/24/2020</a:t>
+              <a:t>9/6/2022</a:t>
             </a:fld>
             <a:endParaRPr lang="en-US"/>
           </a:p>
@@ -5499,13 +5461,6 @@
   <p:transition>
     <p:fade/>
   </p:transition>
-  <p:timing>
-    <p:tnLst>
-      <p:par>
-        <p:cTn id="1" dur="indefinite" restart="never" nodeType="tmRoot"/>
-      </p:par>
-    </p:tnLst>
-  </p:timing>
 </p:sldLayout>
 </file>
 
@@ -5683,7 +5638,7 @@
           <a:p>
             <a:fld id="{5958763E-B898-436D-883D-03711491D54A}" type="datetimeFigureOut">
               <a:rPr lang="en-US" smtClean="0"/>
-              <a:t>3/24/2020</a:t>
+              <a:t>9/6/2022</a:t>
             </a:fld>
             <a:endParaRPr lang="en-US"/>
           </a:p>
@@ -5756,13 +5711,6 @@
   <p:transition>
     <p:fade/>
   </p:transition>
-  <p:timing>
-    <p:tnLst>
-      <p:par>
-        <p:cTn id="1" dur="indefinite" restart="never" nodeType="tmRoot"/>
-      </p:par>
-    </p:tnLst>
-  </p:timing>
 </p:sldLayout>
 </file>
 
@@ -6038,7 +5986,7 @@
           <a:p>
             <a:fld id="{5958763E-B898-436D-883D-03711491D54A}" type="datetimeFigureOut">
               <a:rPr lang="en-US" smtClean="0"/>
-              <a:t>3/24/2020</a:t>
+              <a:t>9/6/2022</a:t>
             </a:fld>
             <a:endParaRPr lang="en-US"/>
           </a:p>
@@ -6099,13 +6047,6 @@
   <p:transition>
     <p:fade/>
   </p:transition>
-  <p:timing>
-    <p:tnLst>
-      <p:par>
-        <p:cTn id="1" dur="indefinite" restart="never" nodeType="tmRoot"/>
-      </p:par>
-    </p:tnLst>
-  </p:timing>
 </p:sldLayout>
 </file>
 
@@ -6461,7 +6402,7 @@
           <a:p>
             <a:fld id="{5958763E-B898-436D-883D-03711491D54A}" type="datetimeFigureOut">
               <a:rPr lang="en-US" smtClean="0"/>
-              <a:t>3/24/2020</a:t>
+              <a:t>9/6/2022</a:t>
             </a:fld>
             <a:endParaRPr lang="en-US"/>
           </a:p>
@@ -6522,13 +6463,6 @@
   <p:transition>
     <p:fade/>
   </p:transition>
-  <p:timing>
-    <p:tnLst>
-      <p:par>
-        <p:cTn id="1" dur="indefinite" restart="never" nodeType="tmRoot"/>
-      </p:par>
-    </p:tnLst>
-  </p:timing>
 </p:sldLayout>
 </file>
 
@@ -6969,7 +6903,7 @@
           <a:p>
             <a:fld id="{5958763E-B898-436D-883D-03711491D54A}" type="datetimeFigureOut">
               <a:rPr lang="en-US" smtClean="0"/>
-              <a:t>3/24/2020</a:t>
+              <a:t>9/6/2022</a:t>
             </a:fld>
             <a:endParaRPr lang="en-US"/>
           </a:p>
@@ -7030,13 +6964,6 @@
   <p:transition>
     <p:fade/>
   </p:transition>
-  <p:timing>
-    <p:tnLst>
-      <p:par>
-        <p:cTn id="1" dur="indefinite" restart="never" nodeType="tmRoot"/>
-      </p:par>
-    </p:tnLst>
-  </p:timing>
 </p:sldLayout>
 </file>
 
@@ -7427,7 +7354,7 @@
           <a:p>
             <a:fld id="{5958763E-B898-436D-883D-03711491D54A}" type="datetimeFigureOut">
               <a:rPr lang="en-US" smtClean="0"/>
-              <a:t>3/24/2020</a:t>
+              <a:t>9/6/2022</a:t>
             </a:fld>
             <a:endParaRPr lang="en-US"/>
           </a:p>
@@ -7488,13 +7415,6 @@
   <p:transition>
     <p:fade/>
   </p:transition>
-  <p:timing>
-    <p:tnLst>
-      <p:par>
-        <p:cTn id="1" dur="indefinite" restart="never" nodeType="tmRoot"/>
-      </p:par>
-    </p:tnLst>
-  </p:timing>
 </p:sldLayout>
 </file>
 
@@ -8045,7 +7965,7 @@
           <a:p>
             <a:fld id="{5958763E-B898-436D-883D-03711491D54A}" type="datetimeFigureOut">
               <a:rPr lang="en-US" smtClean="0"/>
-              <a:t>3/24/2020</a:t>
+              <a:t>9/6/2022</a:t>
             </a:fld>
             <a:endParaRPr lang="en-US"/>
           </a:p>
@@ -8106,13 +8026,6 @@
   <p:transition>
     <p:fade/>
   </p:transition>
-  <p:timing>
-    <p:tnLst>
-      <p:par>
-        <p:cTn id="1" dur="indefinite" restart="never" nodeType="tmRoot"/>
-      </p:par>
-    </p:tnLst>
-  </p:timing>
 </p:sldLayout>
 </file>
 
@@ -8823,7 +8736,7 @@
           <a:p>
             <a:fld id="{5958763E-B898-436D-883D-03711491D54A}" type="datetimeFigureOut">
               <a:rPr lang="en-US" smtClean="0"/>
-              <a:t>3/24/2020</a:t>
+              <a:t>9/6/2022</a:t>
             </a:fld>
             <a:endParaRPr lang="en-US"/>
           </a:p>
@@ -8884,13 +8797,6 @@
   <p:transition>
     <p:fade/>
   </p:transition>
-  <p:timing>
-    <p:tnLst>
-      <p:par>
-        <p:cTn id="1" dur="indefinite" restart="never" nodeType="tmRoot"/>
-      </p:par>
-    </p:tnLst>
-  </p:timing>
 </p:sldLayout>
 </file>
 
@@ -8934,7 +8840,7 @@
           <a:p>
             <a:fld id="{5958763E-B898-436D-883D-03711491D54A}" type="datetimeFigureOut">
               <a:rPr lang="en-US" smtClean="0"/>
-              <a:t>3/24/2020</a:t>
+              <a:t>9/6/2022</a:t>
             </a:fld>
             <a:endParaRPr lang="en-US"/>
           </a:p>
@@ -9007,13 +8913,6 @@
   <p:transition>
     <p:fade/>
   </p:transition>
-  <p:timing>
-    <p:tnLst>
-      <p:par>
-        <p:cTn id="1" dur="indefinite" restart="never" nodeType="tmRoot"/>
-      </p:par>
-    </p:tnLst>
-  </p:timing>
 </p:sldLayout>
 </file>
 
@@ -9093,7 +8992,7 @@
                 <a:spcPct val="0"/>
               </a:spcAft>
             </a:pPr>
-            <a:endParaRPr lang="en-US" sz="2400" dirty="0" err="1" smtClean="0">
+            <a:endParaRPr lang="en-US" sz="2400" dirty="0" err="1">
               <a:gradFill>
                 <a:gsLst>
                   <a:gs pos="0">
@@ -9226,15 +9125,7 @@
           <a:p>
             <a:r>
               <a:rPr lang="en-US" dirty="0"/>
-              <a:t>Click to edit Master </a:t>
-            </a:r>
-            <a:r>
-              <a:rPr lang="en-US" dirty="0" smtClean="0"/>
-              <a:t>subtitle </a:t>
-            </a:r>
-            <a:r>
-              <a:rPr lang="en-US" dirty="0"/>
-              <a:t>style</a:t>
+              <a:t>Click to edit Master subtitle style</a:t>
             </a:r>
           </a:p>
         </p:txBody>
@@ -9276,7 +9167,7 @@
             <a:fld id="{1C2D31DE-C454-491C-B5C3-F097855E3DF7}" type="datetime4">
               <a:rPr lang="en-US" smtClean="0"/>
               <a:pPr/>
-              <a:t>March 24, 2020</a:t>
+              <a:t>September 6, 2022</a:t>
             </a:fld>
             <a:endParaRPr lang="en-US" dirty="0"/>
           </a:p>
@@ -12350,17 +12241,16 @@
           <a:p>
             <a:pPr lvl="0"/>
             <a:r>
-              <a:rPr lang="en-US" dirty="0" smtClean="0"/>
+              <a:rPr lang="en-US" dirty="0"/>
               <a:t>Presenter Name</a:t>
             </a:r>
             <a:br>
-              <a:rPr lang="en-US" dirty="0" smtClean="0"/>
+              <a:rPr lang="en-US" dirty="0"/>
             </a:br>
             <a:r>
-              <a:rPr lang="en-US" dirty="0" smtClean="0"/>
+              <a:rPr lang="en-US" dirty="0"/>
               <a:t>Presenter Title</a:t>
             </a:r>
-            <a:endParaRPr lang="en-US" dirty="0"/>
           </a:p>
         </p:txBody>
       </p:sp>
@@ -12377,13 +12267,6 @@
   <p:transition>
     <p:fade/>
   </p:transition>
-  <p:timing>
-    <p:tnLst>
-      <p:par>
-        <p:cTn id="1" dur="indefinite" restart="never" nodeType="tmRoot"/>
-      </p:par>
-    </p:tnLst>
-  </p:timing>
   <p:hf sldNum="0" hdr="0" ftr="0"/>
 </p:sldLayout>
 </file>
@@ -12436,7 +12319,7 @@
           <a:p>
             <a:fld id="{5958763E-B898-436D-883D-03711491D54A}" type="datetimeFigureOut">
               <a:rPr lang="en-US" smtClean="0"/>
-              <a:t>3/24/2020</a:t>
+              <a:t>9/6/2022</a:t>
             </a:fld>
             <a:endParaRPr lang="en-US"/>
           </a:p>
@@ -12509,13 +12392,6 @@
   <p:transition>
     <p:fade/>
   </p:transition>
-  <p:timing>
-    <p:tnLst>
-      <p:par>
-        <p:cTn id="1" dur="indefinite" restart="never" nodeType="tmRoot"/>
-      </p:par>
-    </p:tnLst>
-  </p:timing>
 </p:sldLayout>
 </file>
 
@@ -12567,7 +12443,7 @@
           <a:p>
             <a:fld id="{5958763E-B898-436D-883D-03711491D54A}" type="datetimeFigureOut">
               <a:rPr lang="en-US" smtClean="0"/>
-              <a:t>3/24/2020</a:t>
+              <a:t>9/6/2022</a:t>
             </a:fld>
             <a:endParaRPr lang="en-US"/>
           </a:p>
@@ -12640,13 +12516,6 @@
   <p:transition>
     <p:fade/>
   </p:transition>
-  <p:timing>
-    <p:tnLst>
-      <p:par>
-        <p:cTn id="1" dur="indefinite" restart="never" nodeType="tmRoot"/>
-      </p:par>
-    </p:tnLst>
-  </p:timing>
 </p:sldLayout>
 </file>
 
@@ -12698,7 +12567,7 @@
           <a:p>
             <a:fld id="{5958763E-B898-436D-883D-03711491D54A}" type="datetimeFigureOut">
               <a:rPr lang="en-US" smtClean="0"/>
-              <a:t>3/24/2020</a:t>
+              <a:t>9/6/2022</a:t>
             </a:fld>
             <a:endParaRPr lang="en-US"/>
           </a:p>
@@ -12771,13 +12640,6 @@
   <p:transition>
     <p:fade/>
   </p:transition>
-  <p:timing>
-    <p:tnLst>
-      <p:par>
-        <p:cTn id="1" dur="indefinite" restart="never" nodeType="tmRoot"/>
-      </p:par>
-    </p:tnLst>
-  </p:timing>
 </p:sldLayout>
 </file>
 
@@ -12829,7 +12691,7 @@
           <a:p>
             <a:fld id="{5958763E-B898-436D-883D-03711491D54A}" type="datetimeFigureOut">
               <a:rPr lang="en-US" smtClean="0"/>
-              <a:t>3/24/2020</a:t>
+              <a:t>9/6/2022</a:t>
             </a:fld>
             <a:endParaRPr lang="en-US"/>
           </a:p>
@@ -12902,13 +12764,6 @@
   <p:transition>
     <p:fade/>
   </p:transition>
-  <p:timing>
-    <p:tnLst>
-      <p:par>
-        <p:cTn id="1" dur="indefinite" restart="never" nodeType="tmRoot"/>
-      </p:par>
-    </p:tnLst>
-  </p:timing>
 </p:sldLayout>
 </file>
 
@@ -12960,7 +12815,7 @@
           <a:p>
             <a:fld id="{5958763E-B898-436D-883D-03711491D54A}" type="datetimeFigureOut">
               <a:rPr lang="en-US" smtClean="0"/>
-              <a:t>3/24/2020</a:t>
+              <a:t>9/6/2022</a:t>
             </a:fld>
             <a:endParaRPr lang="en-US"/>
           </a:p>
@@ -13033,13 +12888,6 @@
   <p:transition>
     <p:fade/>
   </p:transition>
-  <p:timing>
-    <p:tnLst>
-      <p:par>
-        <p:cTn id="1" dur="indefinite" restart="never" nodeType="tmRoot"/>
-      </p:par>
-    </p:tnLst>
-  </p:timing>
 </p:sldLayout>
 </file>
 
@@ -13091,7 +12939,7 @@
           <a:p>
             <a:fld id="{5958763E-B898-436D-883D-03711491D54A}" type="datetimeFigureOut">
               <a:rPr lang="en-US" smtClean="0"/>
-              <a:t>3/24/2020</a:t>
+              <a:t>9/6/2022</a:t>
             </a:fld>
             <a:endParaRPr lang="en-US"/>
           </a:p>
@@ -13164,13 +13012,6 @@
   <p:transition>
     <p:fade/>
   </p:transition>
-  <p:timing>
-    <p:tnLst>
-      <p:par>
-        <p:cTn id="1" dur="indefinite" restart="never" nodeType="tmRoot"/>
-      </p:par>
-    </p:tnLst>
-  </p:timing>
 </p:sldLayout>
 </file>
 
@@ -13222,7 +13063,7 @@
           <a:p>
             <a:fld id="{5958763E-B898-436D-883D-03711491D54A}" type="datetimeFigureOut">
               <a:rPr lang="en-US" smtClean="0"/>
-              <a:t>3/24/2020</a:t>
+              <a:t>9/6/2022</a:t>
             </a:fld>
             <a:endParaRPr lang="en-US"/>
           </a:p>
@@ -13295,13 +13136,6 @@
   <p:transition>
     <p:fade/>
   </p:transition>
-  <p:timing>
-    <p:tnLst>
-      <p:par>
-        <p:cTn id="1" dur="indefinite" restart="never" nodeType="tmRoot"/>
-      </p:par>
-    </p:tnLst>
-  </p:timing>
 </p:sldLayout>
 </file>
 
@@ -13353,7 +13187,7 @@
           <a:p>
             <a:fld id="{5958763E-B898-436D-883D-03711491D54A}" type="datetimeFigureOut">
               <a:rPr lang="en-US" smtClean="0"/>
-              <a:t>3/24/2020</a:t>
+              <a:t>9/6/2022</a:t>
             </a:fld>
             <a:endParaRPr lang="en-US"/>
           </a:p>
@@ -13426,13 +13260,6 @@
   <p:transition>
     <p:fade/>
   </p:transition>
-  <p:timing>
-    <p:tnLst>
-      <p:par>
-        <p:cTn id="1" dur="indefinite" restart="never" nodeType="tmRoot"/>
-      </p:par>
-    </p:tnLst>
-  </p:timing>
 </p:sldLayout>
 </file>
 
@@ -13493,7 +13320,7 @@
           <a:p>
             <a:fld id="{5958763E-B898-436D-883D-03711491D54A}" type="datetimeFigureOut">
               <a:rPr lang="en-US" smtClean="0"/>
-              <a:t>3/24/2020</a:t>
+              <a:t>9/6/2022</a:t>
             </a:fld>
             <a:endParaRPr lang="en-US"/>
           </a:p>
@@ -13566,13 +13393,6 @@
   <p:transition>
     <p:fade/>
   </p:transition>
-  <p:timing>
-    <p:tnLst>
-      <p:par>
-        <p:cTn id="1" dur="indefinite" restart="never" nodeType="tmRoot"/>
-      </p:par>
-    </p:tnLst>
-  </p:timing>
 </p:sldLayout>
 </file>
 
@@ -16574,13 +16394,6 @@
   <p:transition>
     <p:fade/>
   </p:transition>
-  <p:timing>
-    <p:tnLst>
-      <p:par>
-        <p:cTn id="1" dur="indefinite" restart="never" nodeType="tmRoot"/>
-      </p:par>
-    </p:tnLst>
-  </p:timing>
 </p:sldLayout>
 </file>
 
@@ -16668,7 +16481,7 @@
                 <a:spcPct val="0"/>
               </a:spcAft>
             </a:pPr>
-            <a:endParaRPr lang="en-US" sz="2400" dirty="0" err="1" smtClean="0">
+            <a:endParaRPr lang="en-US" sz="2400" dirty="0" err="1">
               <a:gradFill>
                 <a:gsLst>
                   <a:gs pos="0">
@@ -16804,15 +16617,7 @@
           <a:p>
             <a:r>
               <a:rPr lang="en-US" dirty="0"/>
-              <a:t>Click to edit Master </a:t>
-            </a:r>
-            <a:r>
-              <a:rPr lang="en-US" dirty="0" smtClean="0"/>
-              <a:t>subtitle </a:t>
-            </a:r>
-            <a:r>
-              <a:rPr lang="en-US" dirty="0"/>
-              <a:t>style</a:t>
+              <a:t>Click to edit Master subtitle style</a:t>
             </a:r>
           </a:p>
         </p:txBody>
@@ -16854,7 +16659,7 @@
             <a:fld id="{1C2D31DE-C454-491C-B5C3-F097855E3DF7}" type="datetime4">
               <a:rPr lang="en-US" smtClean="0"/>
               <a:pPr/>
-              <a:t>March 24, 2020</a:t>
+              <a:t>September 6, 2022</a:t>
             </a:fld>
             <a:endParaRPr lang="en-US" dirty="0"/>
           </a:p>
@@ -19936,17 +19741,16 @@
           <a:p>
             <a:pPr lvl="0"/>
             <a:r>
-              <a:rPr lang="en-US" dirty="0" smtClean="0"/>
+              <a:rPr lang="en-US" dirty="0"/>
               <a:t>Presenter Name</a:t>
             </a:r>
             <a:br>
-              <a:rPr lang="en-US" dirty="0" smtClean="0"/>
+              <a:rPr lang="en-US" dirty="0"/>
             </a:br>
             <a:r>
-              <a:rPr lang="en-US" dirty="0" smtClean="0"/>
+              <a:rPr lang="en-US" dirty="0"/>
               <a:t>Presenter Title</a:t>
             </a:r>
-            <a:endParaRPr lang="en-US" dirty="0"/>
           </a:p>
         </p:txBody>
       </p:sp>
@@ -19963,13 +19767,6 @@
   <p:transition>
     <p:fade/>
   </p:transition>
-  <p:timing>
-    <p:tnLst>
-      <p:par>
-        <p:cTn id="1" dur="indefinite" restart="never" nodeType="tmRoot"/>
-      </p:par>
-    </p:tnLst>
-  </p:timing>
   <p:hf sldNum="0" hdr="0" ftr="0"/>
 </p:sldLayout>
 </file>
@@ -27479,10 +27276,9 @@
           <a:p>
             <a:pPr lvl="0"/>
             <a:r>
-              <a:rPr lang="en-US" dirty="0" smtClean="0"/>
+              <a:rPr lang="en-US" dirty="0"/>
               <a:t>&lt;Call to action&gt;</a:t>
             </a:r>
-            <a:endParaRPr lang="en-US" dirty="0"/>
           </a:p>
         </p:txBody>
       </p:sp>
@@ -29099,7 +28895,7 @@
           <a:p>
             <a:fld id="{5958763E-B898-436D-883D-03711491D54A}" type="datetimeFigureOut">
               <a:rPr lang="en-US" smtClean="0"/>
-              <a:t>3/24/2020</a:t>
+              <a:t>9/6/2022</a:t>
             </a:fld>
             <a:endParaRPr lang="en-US"/>
           </a:p>
@@ -29226,7 +29022,7 @@
                 <a:spcPct val="0"/>
               </a:spcAft>
             </a:pPr>
-            <a:endParaRPr lang="en-US" sz="2400" dirty="0" err="1" smtClean="0">
+            <a:endParaRPr lang="en-US" sz="2400" dirty="0" err="1">
               <a:gradFill>
                 <a:gsLst>
                   <a:gs pos="0">
@@ -29257,13 +29053,6 @@
   <p:transition>
     <p:fade/>
   </p:transition>
-  <p:timing>
-    <p:tnLst>
-      <p:par>
-        <p:cTn id="1" dur="indefinite" restart="never" nodeType="tmRoot"/>
-      </p:par>
-    </p:tnLst>
-  </p:timing>
 </p:sldLayout>
 </file>
 
@@ -29508,7 +29297,7 @@
           <a:p>
             <a:fld id="{5958763E-B898-436D-883D-03711491D54A}" type="datetimeFigureOut">
               <a:rPr lang="en-US" smtClean="0"/>
-              <a:t>3/24/2020</a:t>
+              <a:t>9/6/2022</a:t>
             </a:fld>
             <a:endParaRPr lang="en-US"/>
           </a:p>
@@ -29581,13 +29370,6 @@
   <p:transition>
     <p:fade/>
   </p:transition>
-  <p:timing>
-    <p:tnLst>
-      <p:par>
-        <p:cTn id="1" dur="indefinite" restart="never" nodeType="tmRoot"/>
-      </p:par>
-    </p:tnLst>
-  </p:timing>
 </p:sldLayout>
 </file>
 
@@ -29809,7 +29591,7 @@
           <a:p>
             <a:fld id="{5958763E-B898-436D-883D-03711491D54A}" type="datetimeFigureOut">
               <a:rPr lang="en-US" smtClean="0"/>
-              <a:t>3/24/2020</a:t>
+              <a:t>9/6/2022</a:t>
             </a:fld>
             <a:endParaRPr lang="en-US"/>
           </a:p>
@@ -29882,13 +29664,6 @@
   <p:transition>
     <p:fade/>
   </p:transition>
-  <p:timing>
-    <p:tnLst>
-      <p:par>
-        <p:cTn id="1" dur="indefinite" restart="never" nodeType="tmRoot"/>
-      </p:par>
-    </p:tnLst>
-  </p:timing>
 </p:sldLayout>
 </file>
 
@@ -30017,7 +29792,7 @@
           <a:p>
             <a:fld id="{5958763E-B898-436D-883D-03711491D54A}" type="datetimeFigureOut">
               <a:rPr lang="en-US" smtClean="0"/>
-              <a:t>3/24/2020</a:t>
+              <a:t>9/6/2022</a:t>
             </a:fld>
             <a:endParaRPr lang="en-US"/>
           </a:p>
@@ -30140,13 +29915,6 @@
   <p:transition>
     <p:fade/>
   </p:transition>
-  <p:timing>
-    <p:tnLst>
-      <p:par>
-        <p:cTn id="1" dur="indefinite" restart="never" nodeType="tmRoot"/>
-      </p:par>
-    </p:tnLst>
-  </p:timing>
 </p:sldLayout>
 </file>
 
@@ -30285,7 +30053,7 @@
           <a:p>
             <a:fld id="{5958763E-B898-436D-883D-03711491D54A}" type="datetimeFigureOut">
               <a:rPr lang="en-US" smtClean="0"/>
-              <a:t>3/24/2020</a:t>
+              <a:t>9/6/2022</a:t>
             </a:fld>
             <a:endParaRPr lang="en-US"/>
           </a:p>
@@ -30412,13 +30180,6 @@
   <p:transition>
     <p:fade/>
   </p:transition>
-  <p:timing>
-    <p:tnLst>
-      <p:par>
-        <p:cTn id="1" dur="indefinite" restart="never" nodeType="tmRoot"/>
-      </p:par>
-    </p:tnLst>
-  </p:timing>
 </p:sldLayout>
 </file>
 
@@ -30580,7 +30341,7 @@
                 <a:spcPct val="0"/>
               </a:spcAft>
             </a:pPr>
-            <a:endParaRPr lang="en-US" sz="2400" dirty="0" err="1" smtClean="0">
+            <a:endParaRPr lang="en-US" sz="2400" dirty="0" err="1">
               <a:gradFill>
                 <a:gsLst>
                   <a:gs pos="0">
@@ -30631,10 +30392,9 @@
           </a:lstStyle>
           <a:p>
             <a:r>
-              <a:rPr lang="en-US" dirty="0" smtClean="0"/>
+              <a:rPr lang="en-US" dirty="0"/>
               <a:t>Type “Agenda”</a:t>
             </a:r>
-            <a:endParaRPr lang="en-US" dirty="0"/>
           </a:p>
         </p:txBody>
       </p:sp>
@@ -30758,24 +30518,23 @@
           <a:p>
             <a:pPr lvl="0"/>
             <a:r>
-              <a:rPr lang="en-US" dirty="0" smtClean="0"/>
+              <a:rPr lang="en-US" dirty="0"/>
               <a:t>Item 1</a:t>
             </a:r>
           </a:p>
           <a:p>
             <a:pPr lvl="0"/>
             <a:r>
-              <a:rPr lang="en-US" dirty="0" smtClean="0"/>
+              <a:rPr lang="en-US" dirty="0"/>
               <a:t>Item 2</a:t>
             </a:r>
           </a:p>
           <a:p>
             <a:pPr lvl="0"/>
             <a:r>
-              <a:rPr lang="en-US" dirty="0" smtClean="0"/>
+              <a:rPr lang="en-US" dirty="0"/>
               <a:t>Item 3</a:t>
             </a:r>
-            <a:endParaRPr lang="en-US" dirty="0"/>
           </a:p>
         </p:txBody>
       </p:sp>
@@ -30802,7 +30561,7 @@
           <a:p>
             <a:fld id="{5958763E-B898-436D-883D-03711491D54A}" type="datetimeFigureOut">
               <a:rPr lang="en-US" smtClean="0"/>
-              <a:t>3/24/2020</a:t>
+              <a:t>9/6/2022</a:t>
             </a:fld>
             <a:endParaRPr lang="en-US"/>
           </a:p>
@@ -30909,13 +30668,6 @@
   <p:transition>
     <p:fade/>
   </p:transition>
-  <p:timing>
-    <p:tnLst>
-      <p:par>
-        <p:cTn id="1" dur="indefinite" restart="never" nodeType="tmRoot"/>
-      </p:par>
-    </p:tnLst>
-  </p:timing>
 </p:sldLayout>
 </file>
 
@@ -31077,7 +30829,7 @@
                 <a:spcPct val="0"/>
               </a:spcAft>
             </a:pPr>
-            <a:endParaRPr lang="en-US" sz="2400" dirty="0" err="1" smtClean="0">
+            <a:endParaRPr lang="en-US" sz="2400" dirty="0" err="1">
               <a:gradFill>
                 <a:gsLst>
                   <a:gs pos="0">
@@ -31130,10 +30882,9 @@
           </a:lstStyle>
           <a:p>
             <a:r>
-              <a:rPr lang="en-US" dirty="0" smtClean="0"/>
+              <a:rPr lang="en-US" dirty="0"/>
               <a:t>Notable Quote</a:t>
             </a:r>
-            <a:endParaRPr lang="en-US" dirty="0"/>
           </a:p>
         </p:txBody>
       </p:sp>
@@ -31260,10 +31011,9 @@
           <a:p>
             <a:pPr lvl="0"/>
             <a:r>
-              <a:rPr lang="en-US" dirty="0" smtClean="0"/>
+              <a:rPr lang="en-US" dirty="0"/>
               <a:t>– Attribution</a:t>
             </a:r>
-            <a:endParaRPr lang="en-US" dirty="0"/>
           </a:p>
         </p:txBody>
       </p:sp>
@@ -31290,7 +31040,7 @@
           <a:p>
             <a:fld id="{5958763E-B898-436D-883D-03711491D54A}" type="datetimeFigureOut">
               <a:rPr lang="en-US" smtClean="0"/>
-              <a:t>3/24/2020</a:t>
+              <a:t>9/6/2022</a:t>
             </a:fld>
             <a:endParaRPr lang="en-US"/>
           </a:p>
@@ -32038,13 +31788,6 @@
   <p:transition>
     <p:fade/>
   </p:transition>
-  <p:timing>
-    <p:tnLst>
-      <p:par>
-        <p:cTn id="1" dur="indefinite" restart="never" nodeType="tmRoot"/>
-      </p:par>
-    </p:tnLst>
-  </p:timing>
 </p:sldLayout>
 </file>
 
@@ -32116,7 +31859,7 @@
           <a:p>
             <a:fld id="{5958763E-B898-436D-883D-03711491D54A}" type="datetimeFigureOut">
               <a:rPr lang="en-US" smtClean="0"/>
-              <a:t>3/24/2020</a:t>
+              <a:t>9/6/2022</a:t>
             </a:fld>
             <a:endParaRPr lang="en-US"/>
           </a:p>
@@ -32189,13 +31932,6 @@
   <p:transition>
     <p:fade/>
   </p:transition>
-  <p:timing>
-    <p:tnLst>
-      <p:par>
-        <p:cTn id="1" dur="indefinite" restart="never" nodeType="tmRoot"/>
-      </p:par>
-    </p:tnLst>
-  </p:timing>
 </p:sldLayout>
 </file>
 
@@ -32324,7 +32060,7 @@
           <a:p>
             <a:fld id="{5958763E-B898-436D-883D-03711491D54A}" type="datetimeFigureOut">
               <a:rPr lang="en-US" smtClean="0"/>
-              <a:t>3/24/2020</a:t>
+              <a:t>9/6/2022</a:t>
             </a:fld>
             <a:endParaRPr lang="en-US"/>
           </a:p>
@@ -32447,13 +32183,6 @@
   <p:transition>
     <p:fade/>
   </p:transition>
-  <p:timing>
-    <p:tnLst>
-      <p:par>
-        <p:cTn id="1" dur="indefinite" restart="never" nodeType="tmRoot"/>
-      </p:par>
-    </p:tnLst>
-  </p:timing>
 </p:sldLayout>
 </file>
 
@@ -32666,7 +32395,7 @@
           <a:p>
             <a:fld id="{5958763E-B898-436D-883D-03711491D54A}" type="datetimeFigureOut">
               <a:rPr lang="en-US" smtClean="0"/>
-              <a:t>3/24/2020</a:t>
+              <a:t>9/6/2022</a:t>
             </a:fld>
             <a:endParaRPr lang="en-US"/>
           </a:p>
@@ -32739,13 +32468,6 @@
   <p:transition>
     <p:fade/>
   </p:transition>
-  <p:timing>
-    <p:tnLst>
-      <p:par>
-        <p:cTn id="1" dur="indefinite" restart="never" nodeType="tmRoot"/>
-      </p:par>
-    </p:tnLst>
-  </p:timing>
 </p:sldLayout>
 </file>
 
@@ -32903,7 +32625,7 @@
           <a:p>
             <a:fld id="{5958763E-B898-436D-883D-03711491D54A}" type="datetimeFigureOut">
               <a:rPr lang="en-US" smtClean="0"/>
-              <a:t>3/24/2020</a:t>
+              <a:t>9/6/2022</a:t>
             </a:fld>
             <a:endParaRPr lang="en-US"/>
           </a:p>
@@ -32976,13 +32698,6 @@
   <p:transition>
     <p:fade/>
   </p:transition>
-  <p:timing>
-    <p:tnLst>
-      <p:par>
-        <p:cTn id="1" dur="indefinite" restart="never" nodeType="tmRoot"/>
-      </p:par>
-    </p:tnLst>
-  </p:timing>
 </p:sldLayout>
 </file>
 
@@ -33154,7 +32869,7 @@
           <a:p>
             <a:fld id="{5958763E-B898-436D-883D-03711491D54A}" type="datetimeFigureOut">
               <a:rPr lang="en-US" smtClean="0"/>
-              <a:t>3/24/2020</a:t>
+              <a:t>9/6/2022</a:t>
             </a:fld>
             <a:endParaRPr lang="en-US"/>
           </a:p>
@@ -33300,13 +33015,6 @@
   <p:transition>
     <p:fade/>
   </p:transition>
-  <p:timing>
-    <p:tnLst>
-      <p:par>
-        <p:cTn id="1" dur="indefinite" restart="never" nodeType="tmRoot"/>
-      </p:par>
-    </p:tnLst>
-  </p:timing>
   <p:txStyles>
     <p:titleStyle>
       <a:lvl1pPr algn="l" defTabSz="914400" rtl="0" eaLnBrk="1" latinLnBrk="0" hangingPunct="1">
@@ -33611,7 +33319,7 @@
       </a:lvl9pPr>
     </p:otherStyle>
   </p:txStyles>
-  <p:extLst mod="1">
+  <p:extLst>
     <p:ext uri="{27BBF7A9-308A-43DC-89C8-2F10F3537804}">
       <p15:sldGuideLst xmlns:p15="http://schemas.microsoft.com/office/powerpoint/2012/main">
         <p15:guide id="1" orient="horz" pos="2160" userDrawn="1">
@@ -33690,10 +33398,9 @@
           <a:lstStyle/>
           <a:p>
             <a:r>
-              <a:rPr lang="en-US" sz="6600" dirty="0" smtClean="0"/>
+              <a:rPr lang="en-US" sz="6600" dirty="0"/>
               <a:t>Data Review Activity</a:t>
             </a:r>
-            <a:endParaRPr lang="en-US" sz="6600" dirty="0"/>
           </a:p>
         </p:txBody>
       </p:sp>
@@ -33718,11 +33425,11 @@
           <a:lstStyle/>
           <a:p>
             <a:r>
-              <a:rPr lang="en-US" dirty="0" smtClean="0"/>
+              <a:rPr lang="en-US" dirty="0"/>
               <a:t>Hy-Tech Club: </a:t>
             </a:r>
             <a:r>
-              <a:rPr lang="en-US" smtClean="0"/>
+              <a:rPr lang="en-US"/>
               <a:t>Web 102</a:t>
             </a:r>
             <a:endParaRPr lang="en-US" dirty="0"/>
@@ -36710,13 +36417,6 @@
   <p:transition>
     <p:fade/>
   </p:transition>
-  <p:timing>
-    <p:tnLst>
-      <p:par>
-        <p:cTn id="1" dur="indefinite" restart="never" nodeType="tmRoot"/>
-      </p:par>
-    </p:tnLst>
-  </p:timing>
 </p:sld>
 </file>
 
@@ -36753,10 +36453,9 @@
           <a:lstStyle/>
           <a:p>
             <a:r>
-              <a:rPr lang="en-US" dirty="0" smtClean="0"/>
+              <a:rPr lang="en-US" dirty="0"/>
               <a:t>What’s the data type?</a:t>
             </a:r>
-            <a:endParaRPr lang="en-US" dirty="0"/>
           </a:p>
         </p:txBody>
       </p:sp>
@@ -36781,7 +36480,7 @@
               <a:buNone/>
             </a:pPr>
             <a:r>
-              <a:rPr lang="en-US" sz="9600" dirty="0" smtClean="0">
+              <a:rPr lang="en-US" sz="9600" dirty="0">
                 <a:solidFill>
                   <a:srgbClr val="A31515"/>
                 </a:solidFill>
@@ -36847,10 +36546,9 @@
           <a:lstStyle/>
           <a:p>
             <a:r>
-              <a:rPr lang="en-US" dirty="0" smtClean="0"/>
+              <a:rPr lang="en-US" dirty="0"/>
               <a:t>What’s the data type?</a:t>
             </a:r>
-            <a:endParaRPr lang="en-US" dirty="0"/>
           </a:p>
         </p:txBody>
       </p:sp>
@@ -37047,7 +36745,7 @@
                 <a:spcPct val="0"/>
               </a:spcAft>
             </a:pPr>
-            <a:endParaRPr lang="en-US" sz="2400" dirty="0" err="1" smtClean="0">
+            <a:endParaRPr lang="en-US" sz="2400" dirty="0" err="1">
               <a:gradFill>
                 <a:gsLst>
                   <a:gs pos="0">
@@ -37114,10 +36812,9 @@
           <a:lstStyle/>
           <a:p>
             <a:r>
-              <a:rPr lang="en-US" dirty="0" smtClean="0"/>
+              <a:rPr lang="en-US" dirty="0"/>
               <a:t>What’s the data type?</a:t>
             </a:r>
-            <a:endParaRPr lang="en-US" dirty="0"/>
           </a:p>
         </p:txBody>
       </p:sp>
@@ -37314,7 +37011,7 @@
                 <a:spcPct val="0"/>
               </a:spcAft>
             </a:pPr>
-            <a:endParaRPr lang="en-US" sz="2400" dirty="0" err="1" smtClean="0">
+            <a:endParaRPr lang="en-US" sz="2400" dirty="0" err="1">
               <a:gradFill>
                 <a:gsLst>
                   <a:gs pos="0">
@@ -37386,10 +37083,9 @@
           <a:lstStyle/>
           <a:p>
             <a:r>
-              <a:rPr lang="en-US" dirty="0" smtClean="0"/>
+              <a:rPr lang="en-US" dirty="0"/>
               <a:t>values</a:t>
             </a:r>
-            <a:endParaRPr lang="en-US" dirty="0"/>
           </a:p>
         </p:txBody>
       </p:sp>
@@ -37442,11 +37138,11 @@
           <a:lstStyle/>
           <a:p>
             <a:r>
-              <a:rPr lang="en-US" dirty="0" smtClean="0"/>
+              <a:rPr lang="en-US" dirty="0"/>
               <a:t>What is the value of the variable </a:t>
             </a:r>
             <a:r>
-              <a:rPr lang="en-US" sz="4000" cap="none" dirty="0" smtClean="0">
+              <a:rPr lang="en-US" sz="4000" cap="none" dirty="0">
                 <a:solidFill>
                   <a:schemeClr val="accent1">
                     <a:lumMod val="20000"/>
@@ -37458,10 +37154,9 @@
               <a:t>x</a:t>
             </a:r>
             <a:r>
-              <a:rPr lang="en-US" dirty="0" smtClean="0"/>
+              <a:rPr lang="en-US" dirty="0"/>
               <a:t>?</a:t>
             </a:r>
-            <a:endParaRPr lang="en-US" dirty="0"/>
           </a:p>
         </p:txBody>
       </p:sp>
@@ -37489,13 +37184,13 @@
               <a:buNone/>
             </a:pPr>
             <a:r>
-              <a:rPr lang="en-US" sz="8000" dirty="0" err="1">
+              <a:rPr lang="en-US" sz="8000" dirty="0">
                 <a:solidFill>
                   <a:srgbClr val="0000FF"/>
                 </a:solidFill>
                 <a:latin typeface="Consolas" panose="020B0609020204030204" pitchFamily="49" charset="0"/>
               </a:rPr>
-              <a:t>var</a:t>
+              <a:t>let</a:t>
             </a:r>
             <a:r>
               <a:rPr lang="en-US" sz="8000" dirty="0">
@@ -37593,7 +37288,7 @@
               <a:t>100</a:t>
             </a:r>
             <a:r>
-              <a:rPr lang="en-US" sz="8000" dirty="0" smtClean="0">
+              <a:rPr lang="en-US" sz="8000" dirty="0">
                 <a:solidFill>
                   <a:srgbClr val="000000"/>
                 </a:solidFill>
@@ -37601,12 +37296,6 @@
               </a:rPr>
               <a:t>;</a:t>
             </a:r>
-            <a:endParaRPr lang="en-US" sz="8000" dirty="0">
-              <a:solidFill>
-                <a:srgbClr val="000000"/>
-              </a:solidFill>
-              <a:latin typeface="Consolas" panose="020B0609020204030204" pitchFamily="49" charset="0"/>
-            </a:endParaRPr>
           </a:p>
         </p:txBody>
       </p:sp>
@@ -37659,11 +37348,11 @@
           <a:lstStyle/>
           <a:p>
             <a:r>
-              <a:rPr lang="en-US" dirty="0" smtClean="0"/>
+              <a:rPr lang="en-US" dirty="0"/>
               <a:t>What is the value of the variable </a:t>
             </a:r>
             <a:r>
-              <a:rPr lang="en-US" sz="4000" cap="none" dirty="0" smtClean="0">
+              <a:rPr lang="en-US" sz="4000" cap="none" dirty="0">
                 <a:solidFill>
                   <a:schemeClr val="accent1">
                     <a:lumMod val="20000"/>
@@ -37675,10 +37364,9 @@
               <a:t>x</a:t>
             </a:r>
             <a:r>
-              <a:rPr lang="en-US" dirty="0" smtClean="0"/>
+              <a:rPr lang="en-US" dirty="0"/>
               <a:t>?</a:t>
             </a:r>
-            <a:endParaRPr lang="en-US" dirty="0"/>
           </a:p>
         </p:txBody>
       </p:sp>
@@ -37706,13 +37394,13 @@
               <a:buNone/>
             </a:pPr>
             <a:r>
-              <a:rPr lang="en-US" sz="8000" dirty="0" err="1">
+              <a:rPr lang="en-US" sz="8000" dirty="0">
                 <a:solidFill>
                   <a:srgbClr val="0000FF"/>
                 </a:solidFill>
                 <a:latin typeface="Consolas" panose="020B0609020204030204" pitchFamily="49" charset="0"/>
               </a:rPr>
-              <a:t>var</a:t>
+              <a:t>let</a:t>
             </a:r>
             <a:r>
               <a:rPr lang="en-US" sz="8000" dirty="0">
@@ -37810,7 +37498,7 @@
               <a:t>18</a:t>
             </a:r>
             <a:r>
-              <a:rPr lang="en-US" sz="8000" dirty="0" smtClean="0">
+              <a:rPr lang="en-US" sz="8000" dirty="0">
                 <a:solidFill>
                   <a:srgbClr val="000000"/>
                 </a:solidFill>
@@ -37818,12 +37506,6 @@
               </a:rPr>
               <a:t>;</a:t>
             </a:r>
-            <a:endParaRPr lang="en-US" sz="8000" dirty="0">
-              <a:solidFill>
-                <a:srgbClr val="000000"/>
-              </a:solidFill>
-              <a:latin typeface="Consolas" panose="020B0609020204030204" pitchFamily="49" charset="0"/>
-            </a:endParaRPr>
           </a:p>
         </p:txBody>
       </p:sp>
@@ -37876,11 +37558,11 @@
           <a:lstStyle/>
           <a:p>
             <a:r>
-              <a:rPr lang="en-US" dirty="0" smtClean="0"/>
+              <a:rPr lang="en-US" dirty="0"/>
               <a:t>What is the value of the variable </a:t>
             </a:r>
             <a:r>
-              <a:rPr lang="en-US" sz="4000" cap="none" dirty="0" smtClean="0">
+              <a:rPr lang="en-US" sz="4000" cap="none" dirty="0">
                 <a:solidFill>
                   <a:schemeClr val="accent1">
                     <a:lumMod val="20000"/>
@@ -37892,10 +37574,9 @@
               <a:t>x</a:t>
             </a:r>
             <a:r>
-              <a:rPr lang="en-US" dirty="0" smtClean="0"/>
+              <a:rPr lang="en-US" dirty="0"/>
               <a:t>?</a:t>
             </a:r>
-            <a:endParaRPr lang="en-US" dirty="0"/>
           </a:p>
         </p:txBody>
       </p:sp>
@@ -37923,13 +37604,13 @@
               <a:buNone/>
             </a:pPr>
             <a:r>
-              <a:rPr lang="en-US" sz="8000" dirty="0" err="1">
+              <a:rPr lang="en-US" sz="8000" dirty="0">
                 <a:solidFill>
                   <a:srgbClr val="0000FF"/>
                 </a:solidFill>
                 <a:latin typeface="Consolas" panose="020B0609020204030204" pitchFamily="49" charset="0"/>
               </a:rPr>
-              <a:t>var</a:t>
+              <a:t>let</a:t>
             </a:r>
             <a:r>
               <a:rPr lang="en-US" sz="8000" dirty="0">
@@ -38096,10 +37777,9 @@
           <a:lstStyle/>
           <a:p>
             <a:r>
-              <a:rPr lang="en-US" dirty="0" smtClean="0"/>
+              <a:rPr lang="en-US" dirty="0"/>
               <a:t>Data types</a:t>
             </a:r>
-            <a:endParaRPr lang="en-US" dirty="0"/>
           </a:p>
         </p:txBody>
       </p:sp>
@@ -38152,10 +37832,9 @@
           <a:lstStyle/>
           <a:p>
             <a:r>
-              <a:rPr lang="en-US" dirty="0" smtClean="0"/>
+              <a:rPr lang="en-US" dirty="0"/>
               <a:t>What’s the data type?</a:t>
             </a:r>
-            <a:endParaRPr lang="en-US" dirty="0"/>
           </a:p>
         </p:txBody>
       </p:sp>
@@ -38180,10 +37859,9 @@
               <a:buNone/>
             </a:pPr>
             <a:r>
-              <a:rPr lang="en-US" sz="16600" dirty="0" smtClean="0"/>
+              <a:rPr lang="en-US" sz="16600" dirty="0"/>
               <a:t>4</a:t>
             </a:r>
-            <a:endParaRPr lang="en-US" sz="16600" dirty="0"/>
           </a:p>
         </p:txBody>
       </p:sp>
@@ -38236,10 +37914,9 @@
           <a:lstStyle/>
           <a:p>
             <a:r>
-              <a:rPr lang="en-US" dirty="0" smtClean="0"/>
+              <a:rPr lang="en-US" dirty="0"/>
               <a:t>What’s the data type?</a:t>
             </a:r>
-            <a:endParaRPr lang="en-US" dirty="0"/>
           </a:p>
         </p:txBody>
       </p:sp>
@@ -38264,10 +37941,9 @@
               <a:buNone/>
             </a:pPr>
             <a:r>
-              <a:rPr lang="en-US" sz="16600" dirty="0" smtClean="0"/>
+              <a:rPr lang="en-US" sz="16600" dirty="0"/>
               <a:t>12.2</a:t>
             </a:r>
-            <a:endParaRPr lang="en-US" sz="16600" dirty="0"/>
           </a:p>
         </p:txBody>
       </p:sp>
@@ -38320,10 +37996,9 @@
           <a:lstStyle/>
           <a:p>
             <a:r>
-              <a:rPr lang="en-US" dirty="0" smtClean="0"/>
+              <a:rPr lang="en-US" dirty="0"/>
               <a:t>What’s the data type?</a:t>
             </a:r>
-            <a:endParaRPr lang="en-US" dirty="0"/>
           </a:p>
         </p:txBody>
       </p:sp>
@@ -38354,16 +38029,7 @@
                 </a:solidFill>
                 <a:latin typeface="Consolas" panose="020B0609020204030204" pitchFamily="49" charset="0"/>
               </a:rPr>
-              <a:t>"Despicable Me</a:t>
-            </a:r>
-            <a:r>
-              <a:rPr lang="en-US" sz="9600" dirty="0" smtClean="0">
-                <a:solidFill>
-                  <a:srgbClr val="A31515"/>
-                </a:solidFill>
-                <a:latin typeface="Consolas" panose="020B0609020204030204" pitchFamily="49" charset="0"/>
-              </a:rPr>
-              <a:t>"</a:t>
+              <a:t>"Despicable Me"</a:t>
             </a:r>
             <a:endParaRPr lang="en-US" sz="9600" dirty="0">
               <a:solidFill>
@@ -38423,10 +38089,9 @@
           <a:lstStyle/>
           <a:p>
             <a:r>
-              <a:rPr lang="en-US" dirty="0" smtClean="0"/>
+              <a:rPr lang="en-US" dirty="0"/>
               <a:t>What’s the data type?</a:t>
             </a:r>
-            <a:endParaRPr lang="en-US" dirty="0"/>
           </a:p>
         </p:txBody>
       </p:sp>
@@ -38451,10 +38116,9 @@
               <a:buNone/>
             </a:pPr>
             <a:r>
-              <a:rPr lang="en-US" sz="16600" dirty="0" smtClean="0"/>
+              <a:rPr lang="en-US" sz="16600" dirty="0"/>
               <a:t>-40042</a:t>
             </a:r>
-            <a:endParaRPr lang="en-US" sz="16600" dirty="0"/>
           </a:p>
         </p:txBody>
       </p:sp>
@@ -38507,10 +38171,9 @@
           <a:lstStyle/>
           <a:p>
             <a:r>
-              <a:rPr lang="en-US" dirty="0" smtClean="0"/>
+              <a:rPr lang="en-US" dirty="0"/>
               <a:t>What’s the data type?</a:t>
             </a:r>
-            <a:endParaRPr lang="en-US" dirty="0"/>
           </a:p>
         </p:txBody>
       </p:sp>
@@ -38535,7 +38198,7 @@
               <a:buNone/>
             </a:pPr>
             <a:r>
-              <a:rPr lang="en-US" sz="9600" dirty="0" smtClean="0">
+              <a:rPr lang="en-US" sz="9600" dirty="0">
                 <a:solidFill>
                   <a:srgbClr val="A31515"/>
                 </a:solidFill>
@@ -38601,10 +38264,9 @@
           <a:lstStyle/>
           <a:p>
             <a:r>
-              <a:rPr lang="en-US" dirty="0" smtClean="0"/>
+              <a:rPr lang="en-US" dirty="0"/>
               <a:t>What’s the data type?</a:t>
             </a:r>
-            <a:endParaRPr lang="en-US" dirty="0"/>
           </a:p>
         </p:txBody>
       </p:sp>
@@ -38629,10 +38291,9 @@
               <a:buNone/>
             </a:pPr>
             <a:r>
-              <a:rPr lang="en-US" sz="16600" dirty="0" smtClean="0"/>
+              <a:rPr lang="en-US" sz="16600" dirty="0"/>
               <a:t>9 + 6</a:t>
             </a:r>
-            <a:endParaRPr lang="en-US" sz="16600" dirty="0"/>
           </a:p>
         </p:txBody>
       </p:sp>
@@ -38685,10 +38346,9 @@
           <a:lstStyle/>
           <a:p>
             <a:r>
-              <a:rPr lang="en-US" dirty="0" smtClean="0"/>
+              <a:rPr lang="en-US" dirty="0"/>
               <a:t>What’s the data type?</a:t>
             </a:r>
-            <a:endParaRPr lang="en-US" dirty="0"/>
           </a:p>
         </p:txBody>
       </p:sp>
@@ -38713,7 +38373,7 @@
               <a:buNone/>
             </a:pPr>
             <a:r>
-              <a:rPr lang="en-US" sz="9600" dirty="0" smtClean="0">
+              <a:rPr lang="en-US" sz="9600" dirty="0">
                 <a:solidFill>
                   <a:srgbClr val="A31515"/>
                 </a:solidFill>

</xml_diff>